<commit_message>
Avances en el Game Manager
Implementado una parte del game manager, referente a eventos de interfaz, pausa y reinicio del juego
</commit_message>
<xml_diff>
--- a/Assets/BounceUp/Otros/GAMA MANAGER v1.pptx
+++ b/Assets/BounceUp/Otros/GAMA MANAGER v1.pptx
@@ -7,6 +7,7 @@
   <p:sldIdLst>
     <p:sldId id="256" r:id="rId2"/>
     <p:sldId id="257" r:id="rId3"/>
+    <p:sldId id="258" r:id="rId4"/>
   </p:sldIdLst>
   <p:sldSz cx="12192000" cy="6858000"/>
   <p:notesSz cx="6858000" cy="9144000"/>
@@ -105,6 +106,11 @@
       </a:defRPr>
     </a:lvl9pPr>
   </p:defaultTextStyle>
+  <p:extLst>
+    <p:ext uri="{EFAFB233-063F-42B5-8137-9DF3F51BA10A}">
+      <p15:sldGuideLst xmlns:p15="http://schemas.microsoft.com/office/powerpoint/2012/main"/>
+    </p:ext>
+  </p:extLst>
 </p:presentation>
 </file>
 
@@ -239,7 +245,7 @@
           <a:p>
             <a:fld id="{338214D8-2EAB-41A9-9603-723A21E27C68}" type="datetimeFigureOut">
               <a:rPr lang="es-BO" smtClean="0"/>
-              <a:t>1/10/2017</a:t>
+              <a:t>21/10/2017</a:t>
             </a:fld>
             <a:endParaRPr lang="es-BO"/>
           </a:p>
@@ -409,7 +415,7 @@
           <a:p>
             <a:fld id="{338214D8-2EAB-41A9-9603-723A21E27C68}" type="datetimeFigureOut">
               <a:rPr lang="es-BO" smtClean="0"/>
-              <a:t>1/10/2017</a:t>
+              <a:t>21/10/2017</a:t>
             </a:fld>
             <a:endParaRPr lang="es-BO"/>
           </a:p>
@@ -589,7 +595,7 @@
           <a:p>
             <a:fld id="{338214D8-2EAB-41A9-9603-723A21E27C68}" type="datetimeFigureOut">
               <a:rPr lang="es-BO" smtClean="0"/>
-              <a:t>1/10/2017</a:t>
+              <a:t>21/10/2017</a:t>
             </a:fld>
             <a:endParaRPr lang="es-BO"/>
           </a:p>
@@ -759,7 +765,7 @@
           <a:p>
             <a:fld id="{338214D8-2EAB-41A9-9603-723A21E27C68}" type="datetimeFigureOut">
               <a:rPr lang="es-BO" smtClean="0"/>
-              <a:t>1/10/2017</a:t>
+              <a:t>21/10/2017</a:t>
             </a:fld>
             <a:endParaRPr lang="es-BO"/>
           </a:p>
@@ -1005,7 +1011,7 @@
           <a:p>
             <a:fld id="{338214D8-2EAB-41A9-9603-723A21E27C68}" type="datetimeFigureOut">
               <a:rPr lang="es-BO" smtClean="0"/>
-              <a:t>1/10/2017</a:t>
+              <a:t>21/10/2017</a:t>
             </a:fld>
             <a:endParaRPr lang="es-BO"/>
           </a:p>
@@ -1237,7 +1243,7 @@
           <a:p>
             <a:fld id="{338214D8-2EAB-41A9-9603-723A21E27C68}" type="datetimeFigureOut">
               <a:rPr lang="es-BO" smtClean="0"/>
-              <a:t>1/10/2017</a:t>
+              <a:t>21/10/2017</a:t>
             </a:fld>
             <a:endParaRPr lang="es-BO"/>
           </a:p>
@@ -1604,7 +1610,7 @@
           <a:p>
             <a:fld id="{338214D8-2EAB-41A9-9603-723A21E27C68}" type="datetimeFigureOut">
               <a:rPr lang="es-BO" smtClean="0"/>
-              <a:t>1/10/2017</a:t>
+              <a:t>21/10/2017</a:t>
             </a:fld>
             <a:endParaRPr lang="es-BO"/>
           </a:p>
@@ -1722,7 +1728,7 @@
           <a:p>
             <a:fld id="{338214D8-2EAB-41A9-9603-723A21E27C68}" type="datetimeFigureOut">
               <a:rPr lang="es-BO" smtClean="0"/>
-              <a:t>1/10/2017</a:t>
+              <a:t>21/10/2017</a:t>
             </a:fld>
             <a:endParaRPr lang="es-BO"/>
           </a:p>
@@ -1817,7 +1823,7 @@
           <a:p>
             <a:fld id="{338214D8-2EAB-41A9-9603-723A21E27C68}" type="datetimeFigureOut">
               <a:rPr lang="es-BO" smtClean="0"/>
-              <a:t>1/10/2017</a:t>
+              <a:t>21/10/2017</a:t>
             </a:fld>
             <a:endParaRPr lang="es-BO"/>
           </a:p>
@@ -2094,7 +2100,7 @@
           <a:p>
             <a:fld id="{338214D8-2EAB-41A9-9603-723A21E27C68}" type="datetimeFigureOut">
               <a:rPr lang="es-BO" smtClean="0"/>
-              <a:t>1/10/2017</a:t>
+              <a:t>21/10/2017</a:t>
             </a:fld>
             <a:endParaRPr lang="es-BO"/>
           </a:p>
@@ -2351,7 +2357,7 @@
           <a:p>
             <a:fld id="{338214D8-2EAB-41A9-9603-723A21E27C68}" type="datetimeFigureOut">
               <a:rPr lang="es-BO" smtClean="0"/>
-              <a:t>1/10/2017</a:t>
+              <a:t>21/10/2017</a:t>
             </a:fld>
             <a:endParaRPr lang="es-BO"/>
           </a:p>
@@ -2564,7 +2570,7 @@
           <a:p>
             <a:fld id="{338214D8-2EAB-41A9-9603-723A21E27C68}" type="datetimeFigureOut">
               <a:rPr lang="es-BO" smtClean="0"/>
-              <a:t>1/10/2017</a:t>
+              <a:t>21/10/2017</a:t>
             </a:fld>
             <a:endParaRPr lang="es-BO"/>
           </a:p>
@@ -5223,6 +5229,1099 @@
 </p:sld>
 </file>
 
+<file path=ppt/slides/slide3.xml><?xml version="1.0" encoding="utf-8"?>
+<p:sld xmlns:a="http://schemas.openxmlformats.org/drawingml/2006/main" xmlns:r="http://schemas.openxmlformats.org/officeDocument/2006/relationships" xmlns:p="http://schemas.openxmlformats.org/presentationml/2006/main">
+  <p:cSld>
+    <p:bg>
+      <p:bgPr>
+        <a:solidFill>
+          <a:schemeClr val="bg1">
+            <a:alpha val="73000"/>
+          </a:schemeClr>
+        </a:solidFill>
+        <a:effectLst/>
+      </p:bgPr>
+    </p:bg>
+    <p:spTree>
+      <p:nvGrpSpPr>
+        <p:cNvPr id="1" name=""/>
+        <p:cNvGrpSpPr/>
+        <p:nvPr/>
+      </p:nvGrpSpPr>
+      <p:grpSpPr>
+        <a:xfrm>
+          <a:off x="0" y="0"/>
+          <a:ext cx="0" cy="0"/>
+          <a:chOff x="0" y="0"/>
+          <a:chExt cx="0" cy="0"/>
+        </a:xfrm>
+      </p:grpSpPr>
+      <p:sp>
+        <p:nvSpPr>
+          <p:cNvPr id="2" name="Título 1"/>
+          <p:cNvSpPr>
+            <a:spLocks noGrp="1"/>
+          </p:cNvSpPr>
+          <p:nvPr>
+            <p:ph type="ctrTitle"/>
+          </p:nvPr>
+        </p:nvSpPr>
+        <p:spPr>
+          <a:xfrm>
+            <a:off x="2801470" y="313765"/>
+            <a:ext cx="6589059" cy="699247"/>
+          </a:xfrm>
+        </p:spPr>
+        <p:txBody>
+          <a:bodyPr>
+            <a:normAutofit fontScale="90000"/>
+          </a:bodyPr>
+          <a:lstStyle/>
+          <a:p>
+            <a:r>
+              <a:rPr lang="es-419" dirty="0" smtClean="0"/>
+              <a:t>GAMA MANAGER </a:t>
+            </a:r>
+            <a:r>
+              <a:rPr lang="es-419" dirty="0" smtClean="0"/>
+              <a:t>v2.0</a:t>
+            </a:r>
+            <a:endParaRPr lang="es-BO" dirty="0"/>
+          </a:p>
+        </p:txBody>
+      </p:sp>
+      <p:sp>
+        <p:nvSpPr>
+          <p:cNvPr id="4" name="Rectángulo 3"/>
+          <p:cNvSpPr/>
+          <p:nvPr/>
+        </p:nvSpPr>
+        <p:spPr>
+          <a:xfrm>
+            <a:off x="107574" y="1819835"/>
+            <a:ext cx="2626659" cy="3370730"/>
+          </a:xfrm>
+          <a:prstGeom prst="rect">
+            <a:avLst/>
+          </a:prstGeom>
+        </p:spPr>
+        <p:style>
+          <a:lnRef idx="2">
+            <a:schemeClr val="dk1"/>
+          </a:lnRef>
+          <a:fillRef idx="1">
+            <a:schemeClr val="lt1"/>
+          </a:fillRef>
+          <a:effectRef idx="0">
+            <a:schemeClr val="dk1"/>
+          </a:effectRef>
+          <a:fontRef idx="minor">
+            <a:schemeClr val="dk1"/>
+          </a:fontRef>
+        </p:style>
+        <p:txBody>
+          <a:bodyPr rtlCol="0" anchor="ctr"/>
+          <a:lstStyle/>
+          <a:p>
+            <a:pPr algn="ctr"/>
+            <a:endParaRPr lang="es-BO" dirty="0"/>
+          </a:p>
+        </p:txBody>
+      </p:sp>
+      <p:sp>
+        <p:nvSpPr>
+          <p:cNvPr id="5" name="CuadroTexto 4"/>
+          <p:cNvSpPr txBox="1"/>
+          <p:nvPr/>
+        </p:nvSpPr>
+        <p:spPr>
+          <a:xfrm>
+            <a:off x="219537" y="1944770"/>
+            <a:ext cx="2402732" cy="369332"/>
+          </a:xfrm>
+          <a:prstGeom prst="rect">
+            <a:avLst/>
+          </a:prstGeom>
+        </p:spPr>
+        <p:style>
+          <a:lnRef idx="0">
+            <a:schemeClr val="dk1"/>
+          </a:lnRef>
+          <a:fillRef idx="3">
+            <a:schemeClr val="dk1"/>
+          </a:fillRef>
+          <a:effectRef idx="3">
+            <a:schemeClr val="dk1"/>
+          </a:effectRef>
+          <a:fontRef idx="minor">
+            <a:schemeClr val="lt1"/>
+          </a:fontRef>
+        </p:style>
+        <p:txBody>
+          <a:bodyPr wrap="square" rtlCol="0">
+            <a:spAutoFit/>
+          </a:bodyPr>
+          <a:lstStyle/>
+          <a:p>
+            <a:r>
+              <a:rPr lang="es-419" dirty="0" smtClean="0">
+                <a:solidFill>
+                  <a:schemeClr val="tx1"/>
+                </a:solidFill>
+              </a:rPr>
+              <a:t>G</a:t>
+            </a:r>
+            <a:r>
+              <a:rPr lang="es-BO" dirty="0" smtClean="0">
+                <a:solidFill>
+                  <a:schemeClr val="tx1"/>
+                </a:solidFill>
+              </a:rPr>
+              <a:t>a</a:t>
+            </a:r>
+            <a:r>
+              <a:rPr lang="es-419" dirty="0" smtClean="0">
+                <a:solidFill>
+                  <a:schemeClr val="tx1"/>
+                </a:solidFill>
+              </a:rPr>
+              <a:t>me Manager</a:t>
+            </a:r>
+            <a:endParaRPr lang="es-BO" dirty="0">
+              <a:solidFill>
+                <a:schemeClr val="tx1"/>
+              </a:solidFill>
+            </a:endParaRPr>
+          </a:p>
+        </p:txBody>
+      </p:sp>
+      <p:sp>
+        <p:nvSpPr>
+          <p:cNvPr id="27" name="CuadroTexto 26"/>
+          <p:cNvSpPr txBox="1"/>
+          <p:nvPr/>
+        </p:nvSpPr>
+        <p:spPr>
+          <a:xfrm>
+            <a:off x="219537" y="2797969"/>
+            <a:ext cx="2402732" cy="369332"/>
+          </a:xfrm>
+          <a:prstGeom prst="rect">
+            <a:avLst/>
+          </a:prstGeom>
+        </p:spPr>
+        <p:style>
+          <a:lnRef idx="0">
+            <a:schemeClr val="accent1"/>
+          </a:lnRef>
+          <a:fillRef idx="3">
+            <a:schemeClr val="accent1"/>
+          </a:fillRef>
+          <a:effectRef idx="3">
+            <a:schemeClr val="accent1"/>
+          </a:effectRef>
+          <a:fontRef idx="minor">
+            <a:schemeClr val="lt1"/>
+          </a:fontRef>
+        </p:style>
+        <p:txBody>
+          <a:bodyPr wrap="square" rtlCol="0">
+            <a:spAutoFit/>
+          </a:bodyPr>
+          <a:lstStyle/>
+          <a:p>
+            <a:r>
+              <a:rPr lang="en-US" dirty="0" err="1" smtClean="0">
+                <a:solidFill>
+                  <a:schemeClr val="tx1"/>
+                </a:solidFill>
+              </a:rPr>
+              <a:t>EventPauseGame</a:t>
+            </a:r>
+            <a:endParaRPr lang="es-BO" dirty="0">
+              <a:solidFill>
+                <a:schemeClr val="tx1"/>
+              </a:solidFill>
+            </a:endParaRPr>
+          </a:p>
+        </p:txBody>
+      </p:sp>
+      <p:sp>
+        <p:nvSpPr>
+          <p:cNvPr id="28" name="CuadroTexto 27"/>
+          <p:cNvSpPr txBox="1"/>
+          <p:nvPr/>
+        </p:nvSpPr>
+        <p:spPr>
+          <a:xfrm>
+            <a:off x="219537" y="3283498"/>
+            <a:ext cx="2402732" cy="369332"/>
+          </a:xfrm>
+          <a:prstGeom prst="rect">
+            <a:avLst/>
+          </a:prstGeom>
+        </p:spPr>
+        <p:style>
+          <a:lnRef idx="0">
+            <a:schemeClr val="accent5"/>
+          </a:lnRef>
+          <a:fillRef idx="3">
+            <a:schemeClr val="accent5"/>
+          </a:fillRef>
+          <a:effectRef idx="3">
+            <a:schemeClr val="accent5"/>
+          </a:effectRef>
+          <a:fontRef idx="minor">
+            <a:schemeClr val="lt1"/>
+          </a:fontRef>
+        </p:style>
+        <p:txBody>
+          <a:bodyPr wrap="square" rtlCol="0">
+            <a:spAutoFit/>
+          </a:bodyPr>
+          <a:lstStyle/>
+          <a:p>
+            <a:r>
+              <a:rPr lang="en-US" dirty="0" err="1" smtClean="0">
+                <a:solidFill>
+                  <a:schemeClr val="tx1"/>
+                </a:solidFill>
+              </a:rPr>
+              <a:t>EventContinueGame</a:t>
+            </a:r>
+            <a:endParaRPr lang="es-BO" dirty="0">
+              <a:solidFill>
+                <a:schemeClr val="tx1"/>
+              </a:solidFill>
+            </a:endParaRPr>
+          </a:p>
+        </p:txBody>
+      </p:sp>
+      <p:sp>
+        <p:nvSpPr>
+          <p:cNvPr id="29" name="CuadroTexto 28"/>
+          <p:cNvSpPr txBox="1"/>
+          <p:nvPr/>
+        </p:nvSpPr>
+        <p:spPr>
+          <a:xfrm>
+            <a:off x="219537" y="3710529"/>
+            <a:ext cx="2402732" cy="369332"/>
+          </a:xfrm>
+          <a:prstGeom prst="rect">
+            <a:avLst/>
+          </a:prstGeom>
+        </p:spPr>
+        <p:style>
+          <a:lnRef idx="0">
+            <a:schemeClr val="accent6"/>
+          </a:lnRef>
+          <a:fillRef idx="3">
+            <a:schemeClr val="accent6"/>
+          </a:fillRef>
+          <a:effectRef idx="3">
+            <a:schemeClr val="accent6"/>
+          </a:effectRef>
+          <a:fontRef idx="minor">
+            <a:schemeClr val="lt1"/>
+          </a:fontRef>
+        </p:style>
+        <p:txBody>
+          <a:bodyPr wrap="square" rtlCol="0">
+            <a:spAutoFit/>
+          </a:bodyPr>
+          <a:lstStyle/>
+          <a:p>
+            <a:r>
+              <a:rPr lang="en-US" dirty="0" err="1" smtClean="0">
+                <a:solidFill>
+                  <a:schemeClr val="tx1"/>
+                </a:solidFill>
+              </a:rPr>
+              <a:t>EventRestartGame</a:t>
+            </a:r>
+            <a:endParaRPr lang="es-BO" dirty="0">
+              <a:solidFill>
+                <a:schemeClr val="tx1"/>
+              </a:solidFill>
+            </a:endParaRPr>
+          </a:p>
+        </p:txBody>
+      </p:sp>
+      <p:sp>
+        <p:nvSpPr>
+          <p:cNvPr id="30" name="CuadroTexto 29"/>
+          <p:cNvSpPr txBox="1"/>
+          <p:nvPr/>
+        </p:nvSpPr>
+        <p:spPr>
+          <a:xfrm>
+            <a:off x="219537" y="4171924"/>
+            <a:ext cx="2402732" cy="369332"/>
+          </a:xfrm>
+          <a:prstGeom prst="rect">
+            <a:avLst/>
+          </a:prstGeom>
+        </p:spPr>
+        <p:style>
+          <a:lnRef idx="2">
+            <a:schemeClr val="accent2">
+              <a:shade val="50000"/>
+            </a:schemeClr>
+          </a:lnRef>
+          <a:fillRef idx="1">
+            <a:schemeClr val="accent2"/>
+          </a:fillRef>
+          <a:effectRef idx="0">
+            <a:schemeClr val="accent2"/>
+          </a:effectRef>
+          <a:fontRef idx="minor">
+            <a:schemeClr val="lt1"/>
+          </a:fontRef>
+        </p:style>
+        <p:txBody>
+          <a:bodyPr wrap="square" rtlCol="0">
+            <a:spAutoFit/>
+          </a:bodyPr>
+          <a:lstStyle/>
+          <a:p>
+            <a:r>
+              <a:rPr lang="en-US" dirty="0" err="1" smtClean="0">
+                <a:solidFill>
+                  <a:schemeClr val="tx1"/>
+                </a:solidFill>
+              </a:rPr>
+              <a:t>EventGoToMenu</a:t>
+            </a:r>
+            <a:endParaRPr lang="es-BO" dirty="0">
+              <a:solidFill>
+                <a:schemeClr val="tx1"/>
+              </a:solidFill>
+            </a:endParaRPr>
+          </a:p>
+        </p:txBody>
+      </p:sp>
+      <p:sp>
+        <p:nvSpPr>
+          <p:cNvPr id="31" name="CuadroTexto 30"/>
+          <p:cNvSpPr txBox="1"/>
+          <p:nvPr/>
+        </p:nvSpPr>
+        <p:spPr>
+          <a:xfrm>
+            <a:off x="219537" y="4651248"/>
+            <a:ext cx="2402732" cy="369332"/>
+          </a:xfrm>
+          <a:prstGeom prst="rect">
+            <a:avLst/>
+          </a:prstGeom>
+          <a:solidFill>
+            <a:srgbClr val="FF0000"/>
+          </a:solidFill>
+        </p:spPr>
+        <p:style>
+          <a:lnRef idx="0">
+            <a:schemeClr val="dk1"/>
+          </a:lnRef>
+          <a:fillRef idx="3">
+            <a:schemeClr val="dk1"/>
+          </a:fillRef>
+          <a:effectRef idx="3">
+            <a:schemeClr val="dk1"/>
+          </a:effectRef>
+          <a:fontRef idx="minor">
+            <a:schemeClr val="lt1"/>
+          </a:fontRef>
+        </p:style>
+        <p:txBody>
+          <a:bodyPr wrap="square" rtlCol="0">
+            <a:spAutoFit/>
+          </a:bodyPr>
+          <a:lstStyle/>
+          <a:p>
+            <a:r>
+              <a:rPr lang="en-US" dirty="0" err="1" smtClean="0">
+                <a:solidFill>
+                  <a:schemeClr val="tx1"/>
+                </a:solidFill>
+              </a:rPr>
+              <a:t>EventGameOver</a:t>
+            </a:r>
+            <a:endParaRPr lang="es-BO" dirty="0">
+              <a:solidFill>
+                <a:schemeClr val="tx1"/>
+              </a:solidFill>
+            </a:endParaRPr>
+          </a:p>
+        </p:txBody>
+      </p:sp>
+      <p:grpSp>
+        <p:nvGrpSpPr>
+          <p:cNvPr id="3" name="Grupo 2"/>
+          <p:cNvGrpSpPr/>
+          <p:nvPr/>
+        </p:nvGrpSpPr>
+        <p:grpSpPr>
+          <a:xfrm>
+            <a:off x="9390529" y="1013012"/>
+            <a:ext cx="2626659" cy="2070847"/>
+            <a:chOff x="3236256" y="1013011"/>
+            <a:chExt cx="2626659" cy="2070847"/>
+          </a:xfrm>
+        </p:grpSpPr>
+        <p:sp>
+          <p:nvSpPr>
+            <p:cNvPr id="32" name="Rectángulo 31"/>
+            <p:cNvSpPr/>
+            <p:nvPr/>
+          </p:nvSpPr>
+          <p:spPr>
+            <a:xfrm>
+              <a:off x="3236256" y="1013011"/>
+              <a:ext cx="2626659" cy="2070847"/>
+            </a:xfrm>
+            <a:prstGeom prst="rect">
+              <a:avLst/>
+            </a:prstGeom>
+          </p:spPr>
+          <p:style>
+            <a:lnRef idx="2">
+              <a:schemeClr val="dk1"/>
+            </a:lnRef>
+            <a:fillRef idx="1">
+              <a:schemeClr val="lt1"/>
+            </a:fillRef>
+            <a:effectRef idx="0">
+              <a:schemeClr val="dk1"/>
+            </a:effectRef>
+            <a:fontRef idx="minor">
+              <a:schemeClr val="dk1"/>
+            </a:fontRef>
+          </p:style>
+          <p:txBody>
+            <a:bodyPr rtlCol="0" anchor="ctr"/>
+            <a:lstStyle/>
+            <a:p>
+              <a:pPr algn="ctr"/>
+              <a:endParaRPr lang="es-BO" dirty="0"/>
+            </a:p>
+          </p:txBody>
+        </p:sp>
+        <p:sp>
+          <p:nvSpPr>
+            <p:cNvPr id="33" name="CuadroTexto 32"/>
+            <p:cNvSpPr txBox="1"/>
+            <p:nvPr/>
+          </p:nvSpPr>
+          <p:spPr>
+            <a:xfrm>
+              <a:off x="3348219" y="1093122"/>
+              <a:ext cx="2402732" cy="646331"/>
+            </a:xfrm>
+            <a:prstGeom prst="rect">
+              <a:avLst/>
+            </a:prstGeom>
+          </p:spPr>
+          <p:style>
+            <a:lnRef idx="0">
+              <a:schemeClr val="dk1"/>
+            </a:lnRef>
+            <a:fillRef idx="3">
+              <a:schemeClr val="dk1"/>
+            </a:fillRef>
+            <a:effectRef idx="3">
+              <a:schemeClr val="dk1"/>
+            </a:effectRef>
+            <a:fontRef idx="minor">
+              <a:schemeClr val="lt1"/>
+            </a:fontRef>
+          </p:style>
+          <p:txBody>
+            <a:bodyPr wrap="square" rtlCol="0">
+              <a:spAutoFit/>
+            </a:bodyPr>
+            <a:lstStyle/>
+            <a:p>
+              <a:r>
+                <a:rPr lang="es-419" dirty="0" smtClean="0">
+                  <a:solidFill>
+                    <a:schemeClr val="tx1"/>
+                  </a:solidFill>
+                </a:rPr>
+                <a:t>G</a:t>
+              </a:r>
+              <a:r>
+                <a:rPr lang="es-BO" dirty="0" smtClean="0">
+                  <a:solidFill>
+                    <a:schemeClr val="tx1"/>
+                  </a:solidFill>
+                </a:rPr>
+                <a:t>a</a:t>
+              </a:r>
+              <a:r>
+                <a:rPr lang="es-419" dirty="0" smtClean="0">
+                  <a:solidFill>
+                    <a:schemeClr val="tx1"/>
+                  </a:solidFill>
+                </a:rPr>
+                <a:t>me </a:t>
+              </a:r>
+              <a:r>
+                <a:rPr lang="es-419" dirty="0" smtClean="0">
+                  <a:solidFill>
+                    <a:schemeClr val="tx1"/>
+                  </a:solidFill>
+                </a:rPr>
+                <a:t>Manager_Pause</a:t>
+              </a:r>
+            </a:p>
+            <a:p>
+              <a:r>
+                <a:rPr lang="es-419" dirty="0" smtClean="0">
+                  <a:solidFill>
+                    <a:schemeClr val="tx1"/>
+                  </a:solidFill>
+                </a:rPr>
+                <a:t>Boton</a:t>
+              </a:r>
+              <a:endParaRPr lang="es-BO" dirty="0">
+                <a:solidFill>
+                  <a:schemeClr val="tx1"/>
+                </a:solidFill>
+              </a:endParaRPr>
+            </a:p>
+          </p:txBody>
+        </p:sp>
+        <p:sp>
+          <p:nvSpPr>
+            <p:cNvPr id="34" name="CuadroTexto 33"/>
+            <p:cNvSpPr txBox="1"/>
+            <p:nvPr/>
+          </p:nvSpPr>
+          <p:spPr>
+            <a:xfrm>
+              <a:off x="3348219" y="2118657"/>
+              <a:ext cx="2402732" cy="369332"/>
+            </a:xfrm>
+            <a:prstGeom prst="rect">
+              <a:avLst/>
+            </a:prstGeom>
+          </p:spPr>
+          <p:style>
+            <a:lnRef idx="0">
+              <a:schemeClr val="accent1"/>
+            </a:lnRef>
+            <a:fillRef idx="3">
+              <a:schemeClr val="accent1"/>
+            </a:fillRef>
+            <a:effectRef idx="3">
+              <a:schemeClr val="accent1"/>
+            </a:effectRef>
+            <a:fontRef idx="minor">
+              <a:schemeClr val="lt1"/>
+            </a:fontRef>
+          </p:style>
+          <p:txBody>
+            <a:bodyPr wrap="square" rtlCol="0">
+              <a:spAutoFit/>
+            </a:bodyPr>
+            <a:lstStyle/>
+            <a:p>
+              <a:r>
+                <a:rPr lang="en-US" dirty="0" err="1" smtClean="0">
+                  <a:solidFill>
+                    <a:schemeClr val="bg1"/>
+                  </a:solidFill>
+                </a:rPr>
+                <a:t>PauseGame</a:t>
+              </a:r>
+              <a:endParaRPr lang="es-BO" dirty="0">
+                <a:solidFill>
+                  <a:schemeClr val="bg1"/>
+                </a:solidFill>
+              </a:endParaRPr>
+            </a:p>
+          </p:txBody>
+        </p:sp>
+        <p:sp>
+          <p:nvSpPr>
+            <p:cNvPr id="35" name="CuadroTexto 34"/>
+            <p:cNvSpPr txBox="1"/>
+            <p:nvPr/>
+          </p:nvSpPr>
+          <p:spPr>
+            <a:xfrm>
+              <a:off x="3348219" y="2604186"/>
+              <a:ext cx="2402732" cy="369332"/>
+            </a:xfrm>
+            <a:prstGeom prst="rect">
+              <a:avLst/>
+            </a:prstGeom>
+          </p:spPr>
+          <p:style>
+            <a:lnRef idx="0">
+              <a:schemeClr val="accent5"/>
+            </a:lnRef>
+            <a:fillRef idx="3">
+              <a:schemeClr val="accent5"/>
+            </a:fillRef>
+            <a:effectRef idx="3">
+              <a:schemeClr val="accent5"/>
+            </a:effectRef>
+            <a:fontRef idx="minor">
+              <a:schemeClr val="lt1"/>
+            </a:fontRef>
+          </p:style>
+          <p:txBody>
+            <a:bodyPr wrap="square" rtlCol="0">
+              <a:spAutoFit/>
+            </a:bodyPr>
+            <a:lstStyle/>
+            <a:p>
+              <a:r>
+                <a:rPr lang="en-US" dirty="0" err="1">
+                  <a:solidFill>
+                    <a:schemeClr val="bg1"/>
+                  </a:solidFill>
+                </a:rPr>
+                <a:t>PauseGame</a:t>
+              </a:r>
+              <a:endParaRPr lang="es-BO" dirty="0">
+                <a:solidFill>
+                  <a:schemeClr val="bg1"/>
+                </a:solidFill>
+              </a:endParaRPr>
+            </a:p>
+          </p:txBody>
+        </p:sp>
+      </p:grpSp>
+      <p:grpSp>
+        <p:nvGrpSpPr>
+          <p:cNvPr id="8" name="Grupo 7"/>
+          <p:cNvGrpSpPr/>
+          <p:nvPr/>
+        </p:nvGrpSpPr>
+        <p:grpSpPr>
+          <a:xfrm>
+            <a:off x="2980856" y="990600"/>
+            <a:ext cx="2626659" cy="1658470"/>
+            <a:chOff x="3236255" y="3362110"/>
+            <a:chExt cx="2626659" cy="1658470"/>
+          </a:xfrm>
+        </p:grpSpPr>
+        <p:sp>
+          <p:nvSpPr>
+            <p:cNvPr id="36" name="Rectángulo 35"/>
+            <p:cNvSpPr/>
+            <p:nvPr/>
+          </p:nvSpPr>
+          <p:spPr>
+            <a:xfrm>
+              <a:off x="3236255" y="3362110"/>
+              <a:ext cx="2626659" cy="1658470"/>
+            </a:xfrm>
+            <a:prstGeom prst="rect">
+              <a:avLst/>
+            </a:prstGeom>
+          </p:spPr>
+          <p:style>
+            <a:lnRef idx="2">
+              <a:schemeClr val="dk1"/>
+            </a:lnRef>
+            <a:fillRef idx="1">
+              <a:schemeClr val="lt1"/>
+            </a:fillRef>
+            <a:effectRef idx="0">
+              <a:schemeClr val="dk1"/>
+            </a:effectRef>
+            <a:fontRef idx="minor">
+              <a:schemeClr val="dk1"/>
+            </a:fontRef>
+          </p:style>
+          <p:txBody>
+            <a:bodyPr rtlCol="0" anchor="ctr"/>
+            <a:lstStyle/>
+            <a:p>
+              <a:pPr algn="ctr"/>
+              <a:endParaRPr lang="es-BO" dirty="0"/>
+            </a:p>
+          </p:txBody>
+        </p:sp>
+        <p:sp>
+          <p:nvSpPr>
+            <p:cNvPr id="37" name="CuadroTexto 36"/>
+            <p:cNvSpPr txBox="1"/>
+            <p:nvPr/>
+          </p:nvSpPr>
+          <p:spPr>
+            <a:xfrm>
+              <a:off x="3348219" y="3506063"/>
+              <a:ext cx="2402732" cy="369332"/>
+            </a:xfrm>
+            <a:prstGeom prst="rect">
+              <a:avLst/>
+            </a:prstGeom>
+          </p:spPr>
+          <p:style>
+            <a:lnRef idx="0">
+              <a:schemeClr val="dk1"/>
+            </a:lnRef>
+            <a:fillRef idx="3">
+              <a:schemeClr val="dk1"/>
+            </a:fillRef>
+            <a:effectRef idx="3">
+              <a:schemeClr val="dk1"/>
+            </a:effectRef>
+            <a:fontRef idx="minor">
+              <a:schemeClr val="lt1"/>
+            </a:fontRef>
+          </p:style>
+          <p:txBody>
+            <a:bodyPr wrap="square" rtlCol="0">
+              <a:spAutoFit/>
+            </a:bodyPr>
+            <a:lstStyle/>
+            <a:p>
+              <a:r>
+                <a:rPr lang="es-419" dirty="0" smtClean="0">
+                  <a:solidFill>
+                    <a:schemeClr val="tx1"/>
+                  </a:solidFill>
+                </a:rPr>
+                <a:t>G</a:t>
+              </a:r>
+              <a:r>
+                <a:rPr lang="es-BO" dirty="0" smtClean="0">
+                  <a:solidFill>
+                    <a:schemeClr val="tx1"/>
+                  </a:solidFill>
+                </a:rPr>
+                <a:t>a</a:t>
+              </a:r>
+              <a:r>
+                <a:rPr lang="es-419" dirty="0" smtClean="0">
+                  <a:solidFill>
+                    <a:schemeClr val="tx1"/>
+                  </a:solidFill>
+                </a:rPr>
+                <a:t>me </a:t>
+              </a:r>
+              <a:r>
+                <a:rPr lang="es-419" dirty="0" smtClean="0">
+                  <a:solidFill>
+                    <a:schemeClr val="tx1"/>
+                  </a:solidFill>
+                </a:rPr>
+                <a:t>Manager_UI</a:t>
+              </a:r>
+            </a:p>
+          </p:txBody>
+        </p:sp>
+        <p:sp>
+          <p:nvSpPr>
+            <p:cNvPr id="38" name="CuadroTexto 37"/>
+            <p:cNvSpPr txBox="1"/>
+            <p:nvPr/>
+          </p:nvSpPr>
+          <p:spPr>
+            <a:xfrm>
+              <a:off x="3348219" y="4069976"/>
+              <a:ext cx="2402732" cy="369332"/>
+            </a:xfrm>
+            <a:prstGeom prst="rect">
+              <a:avLst/>
+            </a:prstGeom>
+          </p:spPr>
+          <p:style>
+            <a:lnRef idx="0">
+              <a:schemeClr val="accent1"/>
+            </a:lnRef>
+            <a:fillRef idx="3">
+              <a:schemeClr val="accent1"/>
+            </a:fillRef>
+            <a:effectRef idx="3">
+              <a:schemeClr val="accent1"/>
+            </a:effectRef>
+            <a:fontRef idx="minor">
+              <a:schemeClr val="lt1"/>
+            </a:fontRef>
+          </p:style>
+          <p:txBody>
+            <a:bodyPr wrap="square" rtlCol="0">
+              <a:spAutoFit/>
+            </a:bodyPr>
+            <a:lstStyle/>
+            <a:p>
+              <a:r>
+                <a:rPr lang="en-US" dirty="0" err="1" smtClean="0">
+                  <a:solidFill>
+                    <a:schemeClr val="tx1"/>
+                  </a:solidFill>
+                </a:rPr>
+                <a:t>ShowUIPause</a:t>
+              </a:r>
+              <a:endParaRPr lang="es-BO" dirty="0">
+                <a:solidFill>
+                  <a:schemeClr val="tx1"/>
+                </a:solidFill>
+              </a:endParaRPr>
+            </a:p>
+          </p:txBody>
+        </p:sp>
+        <p:sp>
+          <p:nvSpPr>
+            <p:cNvPr id="39" name="CuadroTexto 38"/>
+            <p:cNvSpPr txBox="1"/>
+            <p:nvPr/>
+          </p:nvSpPr>
+          <p:spPr>
+            <a:xfrm>
+              <a:off x="3348219" y="4555505"/>
+              <a:ext cx="2402732" cy="369332"/>
+            </a:xfrm>
+            <a:prstGeom prst="rect">
+              <a:avLst/>
+            </a:prstGeom>
+          </p:spPr>
+          <p:style>
+            <a:lnRef idx="0">
+              <a:schemeClr val="accent5"/>
+            </a:lnRef>
+            <a:fillRef idx="3">
+              <a:schemeClr val="accent5"/>
+            </a:fillRef>
+            <a:effectRef idx="3">
+              <a:schemeClr val="accent5"/>
+            </a:effectRef>
+            <a:fontRef idx="minor">
+              <a:schemeClr val="lt1"/>
+            </a:fontRef>
+          </p:style>
+          <p:txBody>
+            <a:bodyPr wrap="square" rtlCol="0">
+              <a:spAutoFit/>
+            </a:bodyPr>
+            <a:lstStyle/>
+            <a:p>
+              <a:r>
+                <a:rPr lang="en-US" dirty="0" err="1" smtClean="0">
+                  <a:solidFill>
+                    <a:schemeClr val="tx1"/>
+                  </a:solidFill>
+                </a:rPr>
+                <a:t>HideUIPause</a:t>
+              </a:r>
+              <a:endParaRPr lang="en-US" dirty="0" smtClean="0">
+                <a:solidFill>
+                  <a:schemeClr val="tx1"/>
+                </a:solidFill>
+              </a:endParaRPr>
+            </a:p>
+          </p:txBody>
+        </p:sp>
+      </p:grpSp>
+      <p:grpSp>
+        <p:nvGrpSpPr>
+          <p:cNvPr id="40" name="Grupo 39"/>
+          <p:cNvGrpSpPr/>
+          <p:nvPr/>
+        </p:nvGrpSpPr>
+        <p:grpSpPr>
+          <a:xfrm>
+            <a:off x="9359245" y="3163970"/>
+            <a:ext cx="2626659" cy="1658470"/>
+            <a:chOff x="3236255" y="3362110"/>
+            <a:chExt cx="2626659" cy="1658470"/>
+          </a:xfrm>
+        </p:grpSpPr>
+        <p:sp>
+          <p:nvSpPr>
+            <p:cNvPr id="41" name="Rectángulo 40"/>
+            <p:cNvSpPr/>
+            <p:nvPr/>
+          </p:nvSpPr>
+          <p:spPr>
+            <a:xfrm>
+              <a:off x="3236255" y="3362110"/>
+              <a:ext cx="2626659" cy="1658470"/>
+            </a:xfrm>
+            <a:prstGeom prst="rect">
+              <a:avLst/>
+            </a:prstGeom>
+          </p:spPr>
+          <p:style>
+            <a:lnRef idx="2">
+              <a:schemeClr val="dk1"/>
+            </a:lnRef>
+            <a:fillRef idx="1">
+              <a:schemeClr val="lt1"/>
+            </a:fillRef>
+            <a:effectRef idx="0">
+              <a:schemeClr val="dk1"/>
+            </a:effectRef>
+            <a:fontRef idx="minor">
+              <a:schemeClr val="dk1"/>
+            </a:fontRef>
+          </p:style>
+          <p:txBody>
+            <a:bodyPr rtlCol="0" anchor="ctr"/>
+            <a:lstStyle/>
+            <a:p>
+              <a:pPr algn="ctr"/>
+              <a:endParaRPr lang="es-BO" dirty="0"/>
+            </a:p>
+          </p:txBody>
+        </p:sp>
+        <p:sp>
+          <p:nvSpPr>
+            <p:cNvPr id="42" name="CuadroTexto 41"/>
+            <p:cNvSpPr txBox="1"/>
+            <p:nvPr/>
+          </p:nvSpPr>
+          <p:spPr>
+            <a:xfrm>
+              <a:off x="3348219" y="3506063"/>
+              <a:ext cx="2402732" cy="646331"/>
+            </a:xfrm>
+            <a:prstGeom prst="rect">
+              <a:avLst/>
+            </a:prstGeom>
+          </p:spPr>
+          <p:style>
+            <a:lnRef idx="0">
+              <a:schemeClr val="dk1"/>
+            </a:lnRef>
+            <a:fillRef idx="3">
+              <a:schemeClr val="dk1"/>
+            </a:fillRef>
+            <a:effectRef idx="3">
+              <a:schemeClr val="dk1"/>
+            </a:effectRef>
+            <a:fontRef idx="minor">
+              <a:schemeClr val="lt1"/>
+            </a:fontRef>
+          </p:style>
+          <p:txBody>
+            <a:bodyPr wrap="square" rtlCol="0">
+              <a:spAutoFit/>
+            </a:bodyPr>
+            <a:lstStyle/>
+            <a:p>
+              <a:r>
+                <a:rPr lang="es-419" dirty="0" smtClean="0">
+                  <a:solidFill>
+                    <a:schemeClr val="tx1"/>
+                  </a:solidFill>
+                </a:rPr>
+                <a:t>G</a:t>
+              </a:r>
+              <a:r>
+                <a:rPr lang="es-BO" dirty="0" smtClean="0">
+                  <a:solidFill>
+                    <a:schemeClr val="tx1"/>
+                  </a:solidFill>
+                </a:rPr>
+                <a:t>a</a:t>
+              </a:r>
+              <a:r>
+                <a:rPr lang="es-419" dirty="0" smtClean="0">
+                  <a:solidFill>
+                    <a:schemeClr val="tx1"/>
+                  </a:solidFill>
+                </a:rPr>
+                <a:t>me </a:t>
+              </a:r>
+              <a:r>
+                <a:rPr lang="es-419" dirty="0" smtClean="0">
+                  <a:solidFill>
+                    <a:schemeClr val="tx1"/>
+                  </a:solidFill>
+                </a:rPr>
+                <a:t>Manager_Restart</a:t>
+              </a:r>
+            </a:p>
+            <a:p>
+              <a:r>
+                <a:rPr lang="es-419" dirty="0" smtClean="0">
+                  <a:solidFill>
+                    <a:schemeClr val="tx1"/>
+                  </a:solidFill>
+                </a:rPr>
+                <a:t>Boton</a:t>
+              </a:r>
+              <a:endParaRPr lang="es-419" dirty="0" smtClean="0">
+                <a:solidFill>
+                  <a:schemeClr val="tx1"/>
+                </a:solidFill>
+              </a:endParaRPr>
+            </a:p>
+          </p:txBody>
+        </p:sp>
+        <p:sp>
+          <p:nvSpPr>
+            <p:cNvPr id="43" name="CuadroTexto 42"/>
+            <p:cNvSpPr txBox="1"/>
+            <p:nvPr/>
+          </p:nvSpPr>
+          <p:spPr>
+            <a:xfrm>
+              <a:off x="3348218" y="4401821"/>
+              <a:ext cx="2402732" cy="369332"/>
+            </a:xfrm>
+            <a:prstGeom prst="rect">
+              <a:avLst/>
+            </a:prstGeom>
+          </p:spPr>
+          <p:style>
+            <a:lnRef idx="0">
+              <a:schemeClr val="accent6"/>
+            </a:lnRef>
+            <a:fillRef idx="3">
+              <a:schemeClr val="accent6"/>
+            </a:fillRef>
+            <a:effectRef idx="3">
+              <a:schemeClr val="accent6"/>
+            </a:effectRef>
+            <a:fontRef idx="minor">
+              <a:schemeClr val="lt1"/>
+            </a:fontRef>
+          </p:style>
+          <p:txBody>
+            <a:bodyPr wrap="square" rtlCol="0">
+              <a:spAutoFit/>
+            </a:bodyPr>
+            <a:lstStyle/>
+            <a:p>
+              <a:r>
+                <a:rPr lang="en-US" dirty="0" err="1" smtClean="0">
+                  <a:solidFill>
+                    <a:schemeClr val="bg1"/>
+                  </a:solidFill>
+                </a:rPr>
+                <a:t>RestartGame</a:t>
+              </a:r>
+              <a:endParaRPr lang="es-BO" dirty="0">
+                <a:solidFill>
+                  <a:schemeClr val="bg1"/>
+                </a:solidFill>
+              </a:endParaRPr>
+            </a:p>
+          </p:txBody>
+        </p:sp>
+      </p:grpSp>
+    </p:spTree>
+    <p:extLst>
+      <p:ext uri="{BB962C8B-B14F-4D97-AF65-F5344CB8AC3E}">
+        <p14:creationId xmlns:p14="http://schemas.microsoft.com/office/powerpoint/2010/main" val="1992144177"/>
+      </p:ext>
+    </p:extLst>
+  </p:cSld>
+  <p:clrMapOvr>
+    <a:overrideClrMapping bg1="dk1" tx1="lt1" bg2="dk2" tx2="lt2" accent1="accent1" accent2="accent2" accent3="accent3" accent4="accent4" accent5="accent5" accent6="accent6" hlink="hlink" folHlink="folHlink"/>
+  </p:clrMapOvr>
+</p:sld>
+</file>
+
 <file path=ppt/theme/theme1.xml><?xml version="1.0" encoding="utf-8"?>
 <a:theme xmlns:a="http://schemas.openxmlformats.org/drawingml/2006/main" name="Office Theme">
   <a:themeElements>
@@ -5482,4 +6581,47 @@
     </a:ext>
   </a:extLst>
 </a:theme>
+</file>
+
+<file path=ppt/theme/themeOverride1.xml><?xml version="1.0" encoding="utf-8"?>
+<a:themeOverride xmlns:a="http://schemas.openxmlformats.org/drawingml/2006/main">
+  <a:clrScheme name="Tema de Office">
+    <a:dk1>
+      <a:sysClr val="windowText" lastClr="000000"/>
+    </a:dk1>
+    <a:lt1>
+      <a:sysClr val="window" lastClr="FFFFFF"/>
+    </a:lt1>
+    <a:dk2>
+      <a:srgbClr val="44546A"/>
+    </a:dk2>
+    <a:lt2>
+      <a:srgbClr val="E7E6E6"/>
+    </a:lt2>
+    <a:accent1>
+      <a:srgbClr val="5B9BD5"/>
+    </a:accent1>
+    <a:accent2>
+      <a:srgbClr val="ED7D31"/>
+    </a:accent2>
+    <a:accent3>
+      <a:srgbClr val="A5A5A5"/>
+    </a:accent3>
+    <a:accent4>
+      <a:srgbClr val="FFC000"/>
+    </a:accent4>
+    <a:accent5>
+      <a:srgbClr val="4472C4"/>
+    </a:accent5>
+    <a:accent6>
+      <a:srgbClr val="70AD47"/>
+    </a:accent6>
+    <a:hlink>
+      <a:srgbClr val="0563C1"/>
+    </a:hlink>
+    <a:folHlink>
+      <a:srgbClr val="954F72"/>
+    </a:folHlink>
+  </a:clrScheme>
+</a:themeOverride>
 </file>
</xml_diff>

<commit_message>
mas avances en game master
se completo mas el game manager.
se descargo nuevo asset de input joystick
</commit_message>
<xml_diff>
--- a/Assets/BounceUp/Otros/GAMA MANAGER v1.pptx
+++ b/Assets/BounceUp/Otros/GAMA MANAGER v1.pptx
@@ -245,7 +245,7 @@
           <a:p>
             <a:fld id="{338214D8-2EAB-41A9-9603-723A21E27C68}" type="datetimeFigureOut">
               <a:rPr lang="es-BO" smtClean="0"/>
-              <a:t>21/10/2017</a:t>
+              <a:t>25/10/2017</a:t>
             </a:fld>
             <a:endParaRPr lang="es-BO"/>
           </a:p>
@@ -415,7 +415,7 @@
           <a:p>
             <a:fld id="{338214D8-2EAB-41A9-9603-723A21E27C68}" type="datetimeFigureOut">
               <a:rPr lang="es-BO" smtClean="0"/>
-              <a:t>21/10/2017</a:t>
+              <a:t>25/10/2017</a:t>
             </a:fld>
             <a:endParaRPr lang="es-BO"/>
           </a:p>
@@ -595,7 +595,7 @@
           <a:p>
             <a:fld id="{338214D8-2EAB-41A9-9603-723A21E27C68}" type="datetimeFigureOut">
               <a:rPr lang="es-BO" smtClean="0"/>
-              <a:t>21/10/2017</a:t>
+              <a:t>25/10/2017</a:t>
             </a:fld>
             <a:endParaRPr lang="es-BO"/>
           </a:p>
@@ -765,7 +765,7 @@
           <a:p>
             <a:fld id="{338214D8-2EAB-41A9-9603-723A21E27C68}" type="datetimeFigureOut">
               <a:rPr lang="es-BO" smtClean="0"/>
-              <a:t>21/10/2017</a:t>
+              <a:t>25/10/2017</a:t>
             </a:fld>
             <a:endParaRPr lang="es-BO"/>
           </a:p>
@@ -1011,7 +1011,7 @@
           <a:p>
             <a:fld id="{338214D8-2EAB-41A9-9603-723A21E27C68}" type="datetimeFigureOut">
               <a:rPr lang="es-BO" smtClean="0"/>
-              <a:t>21/10/2017</a:t>
+              <a:t>25/10/2017</a:t>
             </a:fld>
             <a:endParaRPr lang="es-BO"/>
           </a:p>
@@ -1243,7 +1243,7 @@
           <a:p>
             <a:fld id="{338214D8-2EAB-41A9-9603-723A21E27C68}" type="datetimeFigureOut">
               <a:rPr lang="es-BO" smtClean="0"/>
-              <a:t>21/10/2017</a:t>
+              <a:t>25/10/2017</a:t>
             </a:fld>
             <a:endParaRPr lang="es-BO"/>
           </a:p>
@@ -1610,7 +1610,7 @@
           <a:p>
             <a:fld id="{338214D8-2EAB-41A9-9603-723A21E27C68}" type="datetimeFigureOut">
               <a:rPr lang="es-BO" smtClean="0"/>
-              <a:t>21/10/2017</a:t>
+              <a:t>25/10/2017</a:t>
             </a:fld>
             <a:endParaRPr lang="es-BO"/>
           </a:p>
@@ -1728,7 +1728,7 @@
           <a:p>
             <a:fld id="{338214D8-2EAB-41A9-9603-723A21E27C68}" type="datetimeFigureOut">
               <a:rPr lang="es-BO" smtClean="0"/>
-              <a:t>21/10/2017</a:t>
+              <a:t>25/10/2017</a:t>
             </a:fld>
             <a:endParaRPr lang="es-BO"/>
           </a:p>
@@ -1823,7 +1823,7 @@
           <a:p>
             <a:fld id="{338214D8-2EAB-41A9-9603-723A21E27C68}" type="datetimeFigureOut">
               <a:rPr lang="es-BO" smtClean="0"/>
-              <a:t>21/10/2017</a:t>
+              <a:t>25/10/2017</a:t>
             </a:fld>
             <a:endParaRPr lang="es-BO"/>
           </a:p>
@@ -2100,7 +2100,7 @@
           <a:p>
             <a:fld id="{338214D8-2EAB-41A9-9603-723A21E27C68}" type="datetimeFigureOut">
               <a:rPr lang="es-BO" smtClean="0"/>
-              <a:t>21/10/2017</a:t>
+              <a:t>25/10/2017</a:t>
             </a:fld>
             <a:endParaRPr lang="es-BO"/>
           </a:p>
@@ -2357,7 +2357,7 @@
           <a:p>
             <a:fld id="{338214D8-2EAB-41A9-9603-723A21E27C68}" type="datetimeFigureOut">
               <a:rPr lang="es-BO" smtClean="0"/>
-              <a:t>21/10/2017</a:t>
+              <a:t>25/10/2017</a:t>
             </a:fld>
             <a:endParaRPr lang="es-BO"/>
           </a:p>
@@ -2570,7 +2570,7 @@
           <a:p>
             <a:fld id="{338214D8-2EAB-41A9-9603-723A21E27C68}" type="datetimeFigureOut">
               <a:rPr lang="es-BO" smtClean="0"/>
-              <a:t>21/10/2017</a:t>
+              <a:t>25/10/2017</a:t>
             </a:fld>
             <a:endParaRPr lang="es-BO"/>
           </a:p>
@@ -5280,11 +5280,7 @@
           <a:p>
             <a:r>
               <a:rPr lang="es-419" dirty="0" smtClean="0"/>
-              <a:t>GAMA MANAGER </a:t>
-            </a:r>
-            <a:r>
-              <a:rPr lang="es-419" dirty="0" smtClean="0"/>
-              <a:t>v2.0</a:t>
+              <a:t>GAMA MANAGER v2.0</a:t>
             </a:r>
             <a:endParaRPr lang="es-BO" dirty="0"/>
           </a:p>
@@ -5298,8 +5294,8 @@
         </p:nvSpPr>
         <p:spPr>
           <a:xfrm>
-            <a:off x="107574" y="1819835"/>
-            <a:ext cx="2626659" cy="3370730"/>
+            <a:off x="107574" y="1819834"/>
+            <a:ext cx="2626659" cy="3747247"/>
           </a:xfrm>
           <a:prstGeom prst="rect">
             <a:avLst/>
@@ -5499,64 +5495,13 @@
       </p:sp>
       <p:sp>
         <p:nvSpPr>
-          <p:cNvPr id="29" name="CuadroTexto 28"/>
-          <p:cNvSpPr txBox="1"/>
-          <p:nvPr/>
-        </p:nvSpPr>
-        <p:spPr>
-          <a:xfrm>
-            <a:off x="219537" y="3710529"/>
-            <a:ext cx="2402732" cy="369332"/>
-          </a:xfrm>
-          <a:prstGeom prst="rect">
-            <a:avLst/>
-          </a:prstGeom>
-        </p:spPr>
-        <p:style>
-          <a:lnRef idx="0">
-            <a:schemeClr val="accent6"/>
-          </a:lnRef>
-          <a:fillRef idx="3">
-            <a:schemeClr val="accent6"/>
-          </a:fillRef>
-          <a:effectRef idx="3">
-            <a:schemeClr val="accent6"/>
-          </a:effectRef>
-          <a:fontRef idx="minor">
-            <a:schemeClr val="lt1"/>
-          </a:fontRef>
-        </p:style>
-        <p:txBody>
-          <a:bodyPr wrap="square" rtlCol="0">
-            <a:spAutoFit/>
-          </a:bodyPr>
-          <a:lstStyle/>
-          <a:p>
-            <a:r>
-              <a:rPr lang="en-US" dirty="0" err="1" smtClean="0">
-                <a:solidFill>
-                  <a:schemeClr val="tx1"/>
-                </a:solidFill>
-              </a:rPr>
-              <a:t>EventRestartGame</a:t>
-            </a:r>
-            <a:endParaRPr lang="es-BO" dirty="0">
-              <a:solidFill>
-                <a:schemeClr val="tx1"/>
-              </a:solidFill>
-            </a:endParaRPr>
-          </a:p>
-        </p:txBody>
-      </p:sp>
-      <p:sp>
-        <p:nvSpPr>
           <p:cNvPr id="30" name="CuadroTexto 29"/>
           <p:cNvSpPr txBox="1"/>
           <p:nvPr/>
         </p:nvSpPr>
         <p:spPr>
           <a:xfrm>
-            <a:off x="219537" y="4171924"/>
+            <a:off x="219537" y="3769027"/>
             <a:ext cx="2402732" cy="369332"/>
           </a:xfrm>
           <a:prstGeom prst="rect">
@@ -5609,14 +5554,14 @@
         </p:nvSpPr>
         <p:spPr>
           <a:xfrm>
-            <a:off x="219537" y="4651248"/>
+            <a:off x="219537" y="4248351"/>
             <a:ext cx="2402732" cy="369332"/>
           </a:xfrm>
           <a:prstGeom prst="rect">
             <a:avLst/>
           </a:prstGeom>
           <a:solidFill>
-            <a:srgbClr val="FF0000"/>
+            <a:srgbClr val="7030A0"/>
           </a:solidFill>
         </p:spPr>
         <p:style>
@@ -5764,15 +5709,7 @@
                     <a:schemeClr val="tx1"/>
                   </a:solidFill>
                 </a:rPr>
-                <a:t>me </a:t>
-              </a:r>
-              <a:r>
-                <a:rPr lang="es-419" dirty="0" smtClean="0">
-                  <a:solidFill>
-                    <a:schemeClr val="tx1"/>
-                  </a:solidFill>
-                </a:rPr>
-                <a:t>Manager_Pause</a:t>
+                <a:t>me Manager_Pause</a:t>
               </a:r>
             </a:p>
             <a:p>
@@ -5895,34 +5832,380 @@
           </p:txBody>
         </p:sp>
       </p:grpSp>
+      <p:sp>
+        <p:nvSpPr>
+          <p:cNvPr id="24" name="CuadroTexto 23"/>
+          <p:cNvSpPr txBox="1"/>
+          <p:nvPr/>
+        </p:nvSpPr>
+        <p:spPr>
+          <a:xfrm>
+            <a:off x="219537" y="4706267"/>
+            <a:ext cx="2402732" cy="369332"/>
+          </a:xfrm>
+          <a:prstGeom prst="rect">
+            <a:avLst/>
+          </a:prstGeom>
+          <a:solidFill>
+            <a:srgbClr val="FF0000"/>
+          </a:solidFill>
+        </p:spPr>
+        <p:style>
+          <a:lnRef idx="0">
+            <a:schemeClr val="dk1"/>
+          </a:lnRef>
+          <a:fillRef idx="3">
+            <a:schemeClr val="dk1"/>
+          </a:fillRef>
+          <a:effectRef idx="3">
+            <a:schemeClr val="dk1"/>
+          </a:effectRef>
+          <a:fontRef idx="minor">
+            <a:schemeClr val="lt1"/>
+          </a:fontRef>
+        </p:style>
+        <p:txBody>
+          <a:bodyPr wrap="square" rtlCol="0">
+            <a:spAutoFit/>
+          </a:bodyPr>
+          <a:lstStyle/>
+          <a:p>
+            <a:r>
+              <a:rPr lang="en-US" dirty="0" err="1" smtClean="0">
+                <a:solidFill>
+                  <a:schemeClr val="tx1"/>
+                </a:solidFill>
+              </a:rPr>
+              <a:t>EventUIChange</a:t>
+            </a:r>
+            <a:endParaRPr lang="es-BO" dirty="0">
+              <a:solidFill>
+                <a:schemeClr val="tx1"/>
+              </a:solidFill>
+            </a:endParaRPr>
+          </a:p>
+        </p:txBody>
+      </p:sp>
       <p:grpSp>
         <p:nvGrpSpPr>
-          <p:cNvPr id="8" name="Grupo 7"/>
+          <p:cNvPr id="6" name="Grupo 5"/>
           <p:cNvGrpSpPr/>
           <p:nvPr/>
         </p:nvGrpSpPr>
         <p:grpSpPr>
           <a:xfrm>
             <a:off x="2980856" y="990600"/>
-            <a:ext cx="2626659" cy="1658470"/>
-            <a:chOff x="3236255" y="3362110"/>
-            <a:chExt cx="2626659" cy="1658470"/>
+            <a:ext cx="2626659" cy="2292898"/>
+            <a:chOff x="2980856" y="990600"/>
+            <a:chExt cx="2626659" cy="2292898"/>
+          </a:xfrm>
+        </p:grpSpPr>
+        <p:grpSp>
+          <p:nvGrpSpPr>
+            <p:cNvPr id="8" name="Grupo 7"/>
+            <p:cNvGrpSpPr/>
+            <p:nvPr/>
+          </p:nvGrpSpPr>
+          <p:grpSpPr>
+            <a:xfrm>
+              <a:off x="2980856" y="990600"/>
+              <a:ext cx="2626659" cy="2292898"/>
+              <a:chOff x="3236255" y="3362110"/>
+              <a:chExt cx="2626659" cy="2292898"/>
+            </a:xfrm>
+          </p:grpSpPr>
+          <p:sp>
+            <p:nvSpPr>
+              <p:cNvPr id="36" name="Rectángulo 35"/>
+              <p:cNvSpPr/>
+              <p:nvPr/>
+            </p:nvSpPr>
+            <p:spPr>
+              <a:xfrm>
+                <a:off x="3236255" y="3362110"/>
+                <a:ext cx="2626659" cy="2292898"/>
+              </a:xfrm>
+              <a:prstGeom prst="rect">
+                <a:avLst/>
+              </a:prstGeom>
+            </p:spPr>
+            <p:style>
+              <a:lnRef idx="2">
+                <a:schemeClr val="dk1"/>
+              </a:lnRef>
+              <a:fillRef idx="1">
+                <a:schemeClr val="lt1"/>
+              </a:fillRef>
+              <a:effectRef idx="0">
+                <a:schemeClr val="dk1"/>
+              </a:effectRef>
+              <a:fontRef idx="minor">
+                <a:schemeClr val="dk1"/>
+              </a:fontRef>
+            </p:style>
+            <p:txBody>
+              <a:bodyPr rtlCol="0" anchor="ctr"/>
+              <a:lstStyle/>
+              <a:p>
+                <a:pPr algn="ctr"/>
+                <a:endParaRPr lang="es-BO" dirty="0"/>
+              </a:p>
+            </p:txBody>
+          </p:sp>
+          <p:sp>
+            <p:nvSpPr>
+              <p:cNvPr id="37" name="CuadroTexto 36"/>
+              <p:cNvSpPr txBox="1"/>
+              <p:nvPr/>
+            </p:nvSpPr>
+            <p:spPr>
+              <a:xfrm>
+                <a:off x="3348219" y="3506063"/>
+                <a:ext cx="2402732" cy="369332"/>
+              </a:xfrm>
+              <a:prstGeom prst="rect">
+                <a:avLst/>
+              </a:prstGeom>
+            </p:spPr>
+            <p:style>
+              <a:lnRef idx="0">
+                <a:schemeClr val="dk1"/>
+              </a:lnRef>
+              <a:fillRef idx="3">
+                <a:schemeClr val="dk1"/>
+              </a:fillRef>
+              <a:effectRef idx="3">
+                <a:schemeClr val="dk1"/>
+              </a:effectRef>
+              <a:fontRef idx="minor">
+                <a:schemeClr val="lt1"/>
+              </a:fontRef>
+            </p:style>
+            <p:txBody>
+              <a:bodyPr wrap="square" rtlCol="0">
+                <a:spAutoFit/>
+              </a:bodyPr>
+              <a:lstStyle/>
+              <a:p>
+                <a:r>
+                  <a:rPr lang="es-419" dirty="0" smtClean="0">
+                    <a:solidFill>
+                      <a:schemeClr val="tx1"/>
+                    </a:solidFill>
+                  </a:rPr>
+                  <a:t>G</a:t>
+                </a:r>
+                <a:r>
+                  <a:rPr lang="es-BO" dirty="0" smtClean="0">
+                    <a:solidFill>
+                      <a:schemeClr val="tx1"/>
+                    </a:solidFill>
+                  </a:rPr>
+                  <a:t>a</a:t>
+                </a:r>
+                <a:r>
+                  <a:rPr lang="es-419" dirty="0" smtClean="0">
+                    <a:solidFill>
+                      <a:schemeClr val="tx1"/>
+                    </a:solidFill>
+                  </a:rPr>
+                  <a:t>me Manager_UI</a:t>
+                </a:r>
+              </a:p>
+            </p:txBody>
+          </p:sp>
+          <p:sp>
+            <p:nvSpPr>
+              <p:cNvPr id="38" name="CuadroTexto 37"/>
+              <p:cNvSpPr txBox="1"/>
+              <p:nvPr/>
+            </p:nvSpPr>
+            <p:spPr>
+              <a:xfrm>
+                <a:off x="3348219" y="4069976"/>
+                <a:ext cx="2402732" cy="369332"/>
+              </a:xfrm>
+              <a:prstGeom prst="rect">
+                <a:avLst/>
+              </a:prstGeom>
+            </p:spPr>
+            <p:style>
+              <a:lnRef idx="0">
+                <a:schemeClr val="accent1"/>
+              </a:lnRef>
+              <a:fillRef idx="3">
+                <a:schemeClr val="accent1"/>
+              </a:fillRef>
+              <a:effectRef idx="3">
+                <a:schemeClr val="accent1"/>
+              </a:effectRef>
+              <a:fontRef idx="minor">
+                <a:schemeClr val="lt1"/>
+              </a:fontRef>
+            </p:style>
+            <p:txBody>
+              <a:bodyPr wrap="square" rtlCol="0">
+                <a:spAutoFit/>
+              </a:bodyPr>
+              <a:lstStyle/>
+              <a:p>
+                <a:r>
+                  <a:rPr lang="en-US" dirty="0" err="1" smtClean="0">
+                    <a:solidFill>
+                      <a:schemeClr val="tx1"/>
+                    </a:solidFill>
+                  </a:rPr>
+                  <a:t>ShowUIPause</a:t>
+                </a:r>
+                <a:endParaRPr lang="es-BO" dirty="0">
+                  <a:solidFill>
+                    <a:schemeClr val="tx1"/>
+                  </a:solidFill>
+                </a:endParaRPr>
+              </a:p>
+            </p:txBody>
+          </p:sp>
+          <p:sp>
+            <p:nvSpPr>
+              <p:cNvPr id="39" name="CuadroTexto 38"/>
+              <p:cNvSpPr txBox="1"/>
+              <p:nvPr/>
+            </p:nvSpPr>
+            <p:spPr>
+              <a:xfrm>
+                <a:off x="3348219" y="4555505"/>
+                <a:ext cx="2402732" cy="369332"/>
+              </a:xfrm>
+              <a:prstGeom prst="rect">
+                <a:avLst/>
+              </a:prstGeom>
+            </p:spPr>
+            <p:style>
+              <a:lnRef idx="0">
+                <a:schemeClr val="accent5"/>
+              </a:lnRef>
+              <a:fillRef idx="3">
+                <a:schemeClr val="accent5"/>
+              </a:fillRef>
+              <a:effectRef idx="3">
+                <a:schemeClr val="accent5"/>
+              </a:effectRef>
+              <a:fontRef idx="minor">
+                <a:schemeClr val="lt1"/>
+              </a:fontRef>
+            </p:style>
+            <p:txBody>
+              <a:bodyPr wrap="square" rtlCol="0">
+                <a:spAutoFit/>
+              </a:bodyPr>
+              <a:lstStyle/>
+              <a:p>
+                <a:r>
+                  <a:rPr lang="en-US" dirty="0" err="1" smtClean="0">
+                    <a:solidFill>
+                      <a:schemeClr val="tx1"/>
+                    </a:solidFill>
+                  </a:rPr>
+                  <a:t>HideUIPause</a:t>
+                </a:r>
+                <a:endParaRPr lang="en-US" dirty="0" smtClean="0">
+                  <a:solidFill>
+                    <a:schemeClr val="tx1"/>
+                  </a:solidFill>
+                </a:endParaRPr>
+              </a:p>
+            </p:txBody>
+          </p:sp>
+        </p:grpSp>
+        <p:sp>
+          <p:nvSpPr>
+            <p:cNvPr id="25" name="CuadroTexto 24"/>
+            <p:cNvSpPr txBox="1"/>
+            <p:nvPr/>
+          </p:nvSpPr>
+          <p:spPr>
+            <a:xfrm>
+              <a:off x="3092820" y="2669524"/>
+              <a:ext cx="2402732" cy="369332"/>
+            </a:xfrm>
+            <a:prstGeom prst="rect">
+              <a:avLst/>
+            </a:prstGeom>
+            <a:solidFill>
+              <a:srgbClr val="FF0000"/>
+            </a:solidFill>
+          </p:spPr>
+          <p:style>
+            <a:lnRef idx="0">
+              <a:schemeClr val="dk1"/>
+            </a:lnRef>
+            <a:fillRef idx="3">
+              <a:schemeClr val="dk1"/>
+            </a:fillRef>
+            <a:effectRef idx="3">
+              <a:schemeClr val="dk1"/>
+            </a:effectRef>
+            <a:fontRef idx="minor">
+              <a:schemeClr val="lt1"/>
+            </a:fontRef>
+          </p:style>
+          <p:txBody>
+            <a:bodyPr wrap="square" rtlCol="0">
+              <a:spAutoFit/>
+            </a:bodyPr>
+            <a:lstStyle/>
+            <a:p>
+              <a:r>
+                <a:rPr lang="en-US" dirty="0" err="1" smtClean="0">
+                  <a:solidFill>
+                    <a:schemeClr val="tx1"/>
+                  </a:solidFill>
+                </a:rPr>
+                <a:t>ShowUIGameOver</a:t>
+              </a:r>
+              <a:endParaRPr lang="es-BO" dirty="0">
+                <a:solidFill>
+                  <a:schemeClr val="tx1"/>
+                </a:solidFill>
+              </a:endParaRPr>
+            </a:p>
+          </p:txBody>
+        </p:sp>
+      </p:grpSp>
+      <p:grpSp>
+        <p:nvGrpSpPr>
+          <p:cNvPr id="26" name="Grupo 25"/>
+          <p:cNvGrpSpPr/>
+          <p:nvPr/>
+        </p:nvGrpSpPr>
+        <p:grpSpPr>
+          <a:xfrm>
+            <a:off x="9390528" y="3220974"/>
+            <a:ext cx="2626659" cy="1027378"/>
+            <a:chOff x="3236256" y="1013012"/>
+            <a:chExt cx="2626659" cy="1027378"/>
           </a:xfrm>
         </p:grpSpPr>
         <p:sp>
           <p:nvSpPr>
-            <p:cNvPr id="36" name="Rectángulo 35"/>
+            <p:cNvPr id="44" name="Rectángulo 43"/>
             <p:cNvSpPr/>
             <p:nvPr/>
           </p:nvSpPr>
           <p:spPr>
             <a:xfrm>
-              <a:off x="3236255" y="3362110"/>
-              <a:ext cx="2626659" cy="1658470"/>
+              <a:off x="3236256" y="1013012"/>
+              <a:ext cx="2626659" cy="1027378"/>
             </a:xfrm>
             <a:prstGeom prst="rect">
               <a:avLst/>
             </a:prstGeom>
+            <a:solidFill>
+              <a:schemeClr val="accent6">
+                <a:lumMod val="20000"/>
+                <a:lumOff val="80000"/>
+              </a:schemeClr>
+            </a:solidFill>
           </p:spPr>
           <p:style>
             <a:lnRef idx="2">
@@ -5949,13 +6232,13 @@
         </p:sp>
         <p:sp>
           <p:nvSpPr>
-            <p:cNvPr id="37" name="CuadroTexto 36"/>
+            <p:cNvPr id="45" name="CuadroTexto 44"/>
             <p:cNvSpPr txBox="1"/>
             <p:nvPr/>
           </p:nvSpPr>
           <p:spPr>
             <a:xfrm>
-              <a:off x="3348219" y="3506063"/>
+              <a:off x="3348219" y="1093122"/>
               <a:ext cx="2402732" cy="369332"/>
             </a:xfrm>
             <a:prstGeom prst="rect">
@@ -5988,44 +6271,212 @@
                     <a:schemeClr val="tx1"/>
                   </a:solidFill>
                 </a:rPr>
-                <a:t>G</a:t>
-              </a:r>
-              <a:r>
-                <a:rPr lang="es-BO" dirty="0" smtClean="0">
-                  <a:solidFill>
-                    <a:schemeClr val="tx1"/>
-                  </a:solidFill>
-                </a:rPr>
-                <a:t>a</a:t>
-              </a:r>
-              <a:r>
-                <a:rPr lang="es-419" dirty="0" smtClean="0">
-                  <a:solidFill>
-                    <a:schemeClr val="tx1"/>
-                  </a:solidFill>
-                </a:rPr>
-                <a:t>me </a:t>
-              </a:r>
-              <a:r>
-                <a:rPr lang="es-419" dirty="0" smtClean="0">
-                  <a:solidFill>
-                    <a:schemeClr val="tx1"/>
-                  </a:solidFill>
-                </a:rPr>
-                <a:t>Manager_UI</a:t>
+                <a:t>GameOver Mechanic</a:t>
               </a:r>
             </a:p>
           </p:txBody>
         </p:sp>
+      </p:grpSp>
+      <p:sp>
+        <p:nvSpPr>
+          <p:cNvPr id="48" name="CuadroTexto 47"/>
+          <p:cNvSpPr txBox="1"/>
+          <p:nvPr/>
+        </p:nvSpPr>
+        <p:spPr>
+          <a:xfrm>
+            <a:off x="9502491" y="3740062"/>
+            <a:ext cx="2402732" cy="369332"/>
+          </a:xfrm>
+          <a:prstGeom prst="rect">
+            <a:avLst/>
+          </a:prstGeom>
+          <a:solidFill>
+            <a:srgbClr val="FF0000"/>
+          </a:solidFill>
+        </p:spPr>
+        <p:style>
+          <a:lnRef idx="0">
+            <a:schemeClr val="dk1"/>
+          </a:lnRef>
+          <a:fillRef idx="3">
+            <a:schemeClr val="dk1"/>
+          </a:fillRef>
+          <a:effectRef idx="3">
+            <a:schemeClr val="dk1"/>
+          </a:effectRef>
+          <a:fontRef idx="minor">
+            <a:schemeClr val="lt1"/>
+          </a:fontRef>
+        </p:style>
+        <p:txBody>
+          <a:bodyPr wrap="square" rtlCol="0">
+            <a:spAutoFit/>
+          </a:bodyPr>
+          <a:lstStyle/>
+          <a:p>
+            <a:r>
+              <a:rPr lang="en-US" dirty="0" err="1" smtClean="0">
+                <a:solidFill>
+                  <a:schemeClr val="bg1"/>
+                </a:solidFill>
+              </a:rPr>
+              <a:t>ShowUIGameOver</a:t>
+            </a:r>
+            <a:endParaRPr lang="es-BO" dirty="0">
+              <a:solidFill>
+                <a:schemeClr val="bg1"/>
+              </a:solidFill>
+            </a:endParaRPr>
+          </a:p>
+        </p:txBody>
+      </p:sp>
+      <p:grpSp>
+        <p:nvGrpSpPr>
+          <p:cNvPr id="7" name="Grupo 6"/>
+          <p:cNvGrpSpPr/>
+          <p:nvPr/>
+        </p:nvGrpSpPr>
+        <p:grpSpPr>
+          <a:xfrm>
+            <a:off x="2980856" y="3399695"/>
+            <a:ext cx="2626659" cy="1441246"/>
+            <a:chOff x="2980856" y="3399695"/>
+            <a:chExt cx="2626659" cy="1441246"/>
+          </a:xfrm>
+        </p:grpSpPr>
+        <p:grpSp>
+          <p:nvGrpSpPr>
+            <p:cNvPr id="49" name="Grupo 48"/>
+            <p:cNvGrpSpPr/>
+            <p:nvPr/>
+          </p:nvGrpSpPr>
+          <p:grpSpPr>
+            <a:xfrm>
+              <a:off x="2980856" y="3399695"/>
+              <a:ext cx="2626659" cy="1441246"/>
+              <a:chOff x="3236255" y="3362110"/>
+              <a:chExt cx="2626659" cy="1441246"/>
+            </a:xfrm>
+          </p:grpSpPr>
+          <p:sp>
+            <p:nvSpPr>
+              <p:cNvPr id="50" name="Rectángulo 49"/>
+              <p:cNvSpPr/>
+              <p:nvPr/>
+            </p:nvSpPr>
+            <p:spPr>
+              <a:xfrm>
+                <a:off x="3236255" y="3362110"/>
+                <a:ext cx="2626659" cy="1441246"/>
+              </a:xfrm>
+              <a:prstGeom prst="rect">
+                <a:avLst/>
+              </a:prstGeom>
+            </p:spPr>
+            <p:style>
+              <a:lnRef idx="2">
+                <a:schemeClr val="dk1"/>
+              </a:lnRef>
+              <a:fillRef idx="1">
+                <a:schemeClr val="lt1"/>
+              </a:fillRef>
+              <a:effectRef idx="0">
+                <a:schemeClr val="dk1"/>
+              </a:effectRef>
+              <a:fontRef idx="minor">
+                <a:schemeClr val="dk1"/>
+              </a:fontRef>
+            </p:style>
+            <p:txBody>
+              <a:bodyPr rtlCol="0" anchor="ctr"/>
+              <a:lstStyle/>
+              <a:p>
+                <a:pPr algn="ctr"/>
+                <a:endParaRPr lang="es-BO" dirty="0"/>
+              </a:p>
+            </p:txBody>
+          </p:sp>
+          <p:sp>
+            <p:nvSpPr>
+              <p:cNvPr id="51" name="CuadroTexto 50"/>
+              <p:cNvSpPr txBox="1"/>
+              <p:nvPr/>
+            </p:nvSpPr>
+            <p:spPr>
+              <a:xfrm>
+                <a:off x="3348219" y="3506063"/>
+                <a:ext cx="2402732" cy="646331"/>
+              </a:xfrm>
+              <a:prstGeom prst="rect">
+                <a:avLst/>
+              </a:prstGeom>
+            </p:spPr>
+            <p:style>
+              <a:lnRef idx="0">
+                <a:schemeClr val="dk1"/>
+              </a:lnRef>
+              <a:fillRef idx="3">
+                <a:schemeClr val="dk1"/>
+              </a:fillRef>
+              <a:effectRef idx="3">
+                <a:schemeClr val="dk1"/>
+              </a:effectRef>
+              <a:fontRef idx="minor">
+                <a:schemeClr val="lt1"/>
+              </a:fontRef>
+            </p:style>
+            <p:txBody>
+              <a:bodyPr wrap="square" rtlCol="0">
+                <a:spAutoFit/>
+              </a:bodyPr>
+              <a:lstStyle/>
+              <a:p>
+                <a:r>
+                  <a:rPr lang="es-419" dirty="0" smtClean="0">
+                    <a:solidFill>
+                      <a:schemeClr val="tx1"/>
+                    </a:solidFill>
+                  </a:rPr>
+                  <a:t>G</a:t>
+                </a:r>
+                <a:r>
+                  <a:rPr lang="es-BO" dirty="0" smtClean="0">
+                    <a:solidFill>
+                      <a:schemeClr val="tx1"/>
+                    </a:solidFill>
+                  </a:rPr>
+                  <a:t>a</a:t>
+                </a:r>
+                <a:r>
+                  <a:rPr lang="es-419" dirty="0" smtClean="0">
+                    <a:solidFill>
+                      <a:schemeClr val="tx1"/>
+                    </a:solidFill>
+                  </a:rPr>
+                  <a:t>me </a:t>
+                </a:r>
+                <a:r>
+                  <a:rPr lang="es-419" dirty="0" smtClean="0">
+                    <a:solidFill>
+                      <a:schemeClr val="tx1"/>
+                    </a:solidFill>
+                  </a:rPr>
+                  <a:t>Manager_GoToMenu</a:t>
+                </a:r>
+              </a:p>
+            </p:txBody>
+          </p:sp>
+        </p:grpSp>
         <p:sp>
           <p:nvSpPr>
-            <p:cNvPr id="38" name="CuadroTexto 37"/>
+            <p:cNvPr id="54" name="CuadroTexto 53"/>
             <p:cNvSpPr txBox="1"/>
             <p:nvPr/>
           </p:nvSpPr>
           <p:spPr>
             <a:xfrm>
-              <a:off x="3348219" y="4069976"/>
+              <a:off x="3092820" y="4333932"/>
               <a:ext cx="2402732" cy="369332"/>
             </a:xfrm>
             <a:prstGeom prst="rect">
@@ -6033,14 +6484,16 @@
             </a:prstGeom>
           </p:spPr>
           <p:style>
-            <a:lnRef idx="0">
-              <a:schemeClr val="accent1"/>
+            <a:lnRef idx="2">
+              <a:schemeClr val="accent2">
+                <a:shade val="50000"/>
+              </a:schemeClr>
             </a:lnRef>
-            <a:fillRef idx="3">
-              <a:schemeClr val="accent1"/>
+            <a:fillRef idx="1">
+              <a:schemeClr val="accent2"/>
             </a:fillRef>
-            <a:effectRef idx="3">
-              <a:schemeClr val="accent1"/>
+            <a:effectRef idx="0">
+              <a:schemeClr val="accent2"/>
             </a:effectRef>
             <a:fontRef idx="minor">
               <a:schemeClr val="lt1"/>
@@ -6058,60 +6511,9 @@
                     <a:schemeClr val="tx1"/>
                   </a:solidFill>
                 </a:rPr>
-                <a:t>ShowUIPause</a:t>
+                <a:t>GoToMenuScene</a:t>
               </a:r>
               <a:endParaRPr lang="es-BO" dirty="0">
-                <a:solidFill>
-                  <a:schemeClr val="tx1"/>
-                </a:solidFill>
-              </a:endParaRPr>
-            </a:p>
-          </p:txBody>
-        </p:sp>
-        <p:sp>
-          <p:nvSpPr>
-            <p:cNvPr id="39" name="CuadroTexto 38"/>
-            <p:cNvSpPr txBox="1"/>
-            <p:nvPr/>
-          </p:nvSpPr>
-          <p:spPr>
-            <a:xfrm>
-              <a:off x="3348219" y="4555505"/>
-              <a:ext cx="2402732" cy="369332"/>
-            </a:xfrm>
-            <a:prstGeom prst="rect">
-              <a:avLst/>
-            </a:prstGeom>
-          </p:spPr>
-          <p:style>
-            <a:lnRef idx="0">
-              <a:schemeClr val="accent5"/>
-            </a:lnRef>
-            <a:fillRef idx="3">
-              <a:schemeClr val="accent5"/>
-            </a:fillRef>
-            <a:effectRef idx="3">
-              <a:schemeClr val="accent5"/>
-            </a:effectRef>
-            <a:fontRef idx="minor">
-              <a:schemeClr val="lt1"/>
-            </a:fontRef>
-          </p:style>
-          <p:txBody>
-            <a:bodyPr wrap="square" rtlCol="0">
-              <a:spAutoFit/>
-            </a:bodyPr>
-            <a:lstStyle/>
-            <a:p>
-              <a:r>
-                <a:rPr lang="en-US" dirty="0" err="1" smtClean="0">
-                  <a:solidFill>
-                    <a:schemeClr val="tx1"/>
-                  </a:solidFill>
-                </a:rPr>
-                <a:t>HideUIPause</a:t>
-              </a:r>
-              <a:endParaRPr lang="en-US" dirty="0" smtClean="0">
                 <a:solidFill>
                   <a:schemeClr val="tx1"/>
                 </a:solidFill>
@@ -6122,28 +6524,143 @@
       </p:grpSp>
       <p:grpSp>
         <p:nvGrpSpPr>
-          <p:cNvPr id="40" name="Grupo 39"/>
+          <p:cNvPr id="55" name="Grupo 54"/>
           <p:cNvGrpSpPr/>
           <p:nvPr/>
         </p:nvGrpSpPr>
         <p:grpSpPr>
           <a:xfrm>
-            <a:off x="9359245" y="3163970"/>
-            <a:ext cx="2626659" cy="1658470"/>
-            <a:chOff x="3236255" y="3362110"/>
-            <a:chExt cx="2626659" cy="1658470"/>
+            <a:off x="9390527" y="4433017"/>
+            <a:ext cx="2626659" cy="1441246"/>
+            <a:chOff x="2980856" y="3399695"/>
+            <a:chExt cx="2626659" cy="1441246"/>
           </a:xfrm>
         </p:grpSpPr>
+        <p:grpSp>
+          <p:nvGrpSpPr>
+            <p:cNvPr id="56" name="Grupo 55"/>
+            <p:cNvGrpSpPr/>
+            <p:nvPr/>
+          </p:nvGrpSpPr>
+          <p:grpSpPr>
+            <a:xfrm>
+              <a:off x="2980856" y="3399695"/>
+              <a:ext cx="2626659" cy="1441246"/>
+              <a:chOff x="3236255" y="3362110"/>
+              <a:chExt cx="2626659" cy="1441246"/>
+            </a:xfrm>
+          </p:grpSpPr>
+          <p:sp>
+            <p:nvSpPr>
+              <p:cNvPr id="58" name="Rectángulo 57"/>
+              <p:cNvSpPr/>
+              <p:nvPr/>
+            </p:nvSpPr>
+            <p:spPr>
+              <a:xfrm>
+                <a:off x="3236255" y="3362110"/>
+                <a:ext cx="2626659" cy="1441246"/>
+              </a:xfrm>
+              <a:prstGeom prst="rect">
+                <a:avLst/>
+              </a:prstGeom>
+            </p:spPr>
+            <p:style>
+              <a:lnRef idx="2">
+                <a:schemeClr val="dk1"/>
+              </a:lnRef>
+              <a:fillRef idx="1">
+                <a:schemeClr val="lt1"/>
+              </a:fillRef>
+              <a:effectRef idx="0">
+                <a:schemeClr val="dk1"/>
+              </a:effectRef>
+              <a:fontRef idx="minor">
+                <a:schemeClr val="dk1"/>
+              </a:fontRef>
+            </p:style>
+            <p:txBody>
+              <a:bodyPr rtlCol="0" anchor="ctr"/>
+              <a:lstStyle/>
+              <a:p>
+                <a:pPr algn="ctr"/>
+                <a:endParaRPr lang="es-BO" dirty="0"/>
+              </a:p>
+            </p:txBody>
+          </p:sp>
+          <p:sp>
+            <p:nvSpPr>
+              <p:cNvPr id="59" name="CuadroTexto 58"/>
+              <p:cNvSpPr txBox="1"/>
+              <p:nvPr/>
+            </p:nvSpPr>
+            <p:spPr>
+              <a:xfrm>
+                <a:off x="3348219" y="3506063"/>
+                <a:ext cx="2402732" cy="646331"/>
+              </a:xfrm>
+              <a:prstGeom prst="rect">
+                <a:avLst/>
+              </a:prstGeom>
+            </p:spPr>
+            <p:style>
+              <a:lnRef idx="0">
+                <a:schemeClr val="dk1"/>
+              </a:lnRef>
+              <a:fillRef idx="3">
+                <a:schemeClr val="dk1"/>
+              </a:fillRef>
+              <a:effectRef idx="3">
+                <a:schemeClr val="dk1"/>
+              </a:effectRef>
+              <a:fontRef idx="minor">
+                <a:schemeClr val="lt1"/>
+              </a:fontRef>
+            </p:style>
+            <p:txBody>
+              <a:bodyPr wrap="square" rtlCol="0">
+                <a:spAutoFit/>
+              </a:bodyPr>
+              <a:lstStyle/>
+              <a:p>
+                <a:r>
+                  <a:rPr lang="es-419" dirty="0" smtClean="0">
+                    <a:solidFill>
+                      <a:schemeClr val="tx1"/>
+                    </a:solidFill>
+                  </a:rPr>
+                  <a:t>G</a:t>
+                </a:r>
+                <a:r>
+                  <a:rPr lang="es-BO" dirty="0" smtClean="0">
+                    <a:solidFill>
+                      <a:schemeClr val="tx1"/>
+                    </a:solidFill>
+                  </a:rPr>
+                  <a:t>a</a:t>
+                </a:r>
+                <a:r>
+                  <a:rPr lang="es-419" dirty="0" smtClean="0">
+                    <a:solidFill>
+                      <a:schemeClr val="tx1"/>
+                    </a:solidFill>
+                  </a:rPr>
+                  <a:t>me Manager_Salir Boton</a:t>
+                </a:r>
+              </a:p>
+            </p:txBody>
+          </p:sp>
+        </p:grpSp>
         <p:sp>
           <p:nvSpPr>
-            <p:cNvPr id="41" name="Rectángulo 40"/>
-            <p:cNvSpPr/>
+            <p:cNvPr id="57" name="CuadroTexto 56"/>
+            <p:cNvSpPr txBox="1"/>
             <p:nvPr/>
           </p:nvSpPr>
           <p:spPr>
             <a:xfrm>
-              <a:off x="3236255" y="3362110"/>
-              <a:ext cx="2626659" cy="1658470"/>
+              <a:off x="3092820" y="4333932"/>
+              <a:ext cx="2402732" cy="369332"/>
             </a:xfrm>
             <a:prstGeom prst="rect">
               <a:avLst/>
@@ -6151,136 +6668,15 @@
           </p:spPr>
           <p:style>
             <a:lnRef idx="2">
-              <a:schemeClr val="dk1"/>
+              <a:schemeClr val="accent2">
+                <a:shade val="50000"/>
+              </a:schemeClr>
             </a:lnRef>
             <a:fillRef idx="1">
-              <a:schemeClr val="lt1"/>
+              <a:schemeClr val="accent2"/>
             </a:fillRef>
             <a:effectRef idx="0">
-              <a:schemeClr val="dk1"/>
-            </a:effectRef>
-            <a:fontRef idx="minor">
-              <a:schemeClr val="dk1"/>
-            </a:fontRef>
-          </p:style>
-          <p:txBody>
-            <a:bodyPr rtlCol="0" anchor="ctr"/>
-            <a:lstStyle/>
-            <a:p>
-              <a:pPr algn="ctr"/>
-              <a:endParaRPr lang="es-BO" dirty="0"/>
-            </a:p>
-          </p:txBody>
-        </p:sp>
-        <p:sp>
-          <p:nvSpPr>
-            <p:cNvPr id="42" name="CuadroTexto 41"/>
-            <p:cNvSpPr txBox="1"/>
-            <p:nvPr/>
-          </p:nvSpPr>
-          <p:spPr>
-            <a:xfrm>
-              <a:off x="3348219" y="3506063"/>
-              <a:ext cx="2402732" cy="646331"/>
-            </a:xfrm>
-            <a:prstGeom prst="rect">
-              <a:avLst/>
-            </a:prstGeom>
-          </p:spPr>
-          <p:style>
-            <a:lnRef idx="0">
-              <a:schemeClr val="dk1"/>
-            </a:lnRef>
-            <a:fillRef idx="3">
-              <a:schemeClr val="dk1"/>
-            </a:fillRef>
-            <a:effectRef idx="3">
-              <a:schemeClr val="dk1"/>
-            </a:effectRef>
-            <a:fontRef idx="minor">
-              <a:schemeClr val="lt1"/>
-            </a:fontRef>
-          </p:style>
-          <p:txBody>
-            <a:bodyPr wrap="square" rtlCol="0">
-              <a:spAutoFit/>
-            </a:bodyPr>
-            <a:lstStyle/>
-            <a:p>
-              <a:r>
-                <a:rPr lang="es-419" dirty="0" smtClean="0">
-                  <a:solidFill>
-                    <a:schemeClr val="tx1"/>
-                  </a:solidFill>
-                </a:rPr>
-                <a:t>G</a:t>
-              </a:r>
-              <a:r>
-                <a:rPr lang="es-BO" dirty="0" smtClean="0">
-                  <a:solidFill>
-                    <a:schemeClr val="tx1"/>
-                  </a:solidFill>
-                </a:rPr>
-                <a:t>a</a:t>
-              </a:r>
-              <a:r>
-                <a:rPr lang="es-419" dirty="0" smtClean="0">
-                  <a:solidFill>
-                    <a:schemeClr val="tx1"/>
-                  </a:solidFill>
-                </a:rPr>
-                <a:t>me </a:t>
-              </a:r>
-              <a:r>
-                <a:rPr lang="es-419" dirty="0" smtClean="0">
-                  <a:solidFill>
-                    <a:schemeClr val="tx1"/>
-                  </a:solidFill>
-                </a:rPr>
-                <a:t>Manager_Restart</a:t>
-              </a:r>
-            </a:p>
-            <a:p>
-              <a:r>
-                <a:rPr lang="es-419" dirty="0" smtClean="0">
-                  <a:solidFill>
-                    <a:schemeClr val="tx1"/>
-                  </a:solidFill>
-                </a:rPr>
-                <a:t>Boton</a:t>
-              </a:r>
-              <a:endParaRPr lang="es-419" dirty="0" smtClean="0">
-                <a:solidFill>
-                  <a:schemeClr val="tx1"/>
-                </a:solidFill>
-              </a:endParaRPr>
-            </a:p>
-          </p:txBody>
-        </p:sp>
-        <p:sp>
-          <p:nvSpPr>
-            <p:cNvPr id="43" name="CuadroTexto 42"/>
-            <p:cNvSpPr txBox="1"/>
-            <p:nvPr/>
-          </p:nvSpPr>
-          <p:spPr>
-            <a:xfrm>
-              <a:off x="3348218" y="4401821"/>
-              <a:ext cx="2402732" cy="369332"/>
-            </a:xfrm>
-            <a:prstGeom prst="rect">
-              <a:avLst/>
-            </a:prstGeom>
-          </p:spPr>
-          <p:style>
-            <a:lnRef idx="0">
-              <a:schemeClr val="accent6"/>
-            </a:lnRef>
-            <a:fillRef idx="3">
-              <a:schemeClr val="accent6"/>
-            </a:fillRef>
-            <a:effectRef idx="3">
-              <a:schemeClr val="accent6"/>
+              <a:schemeClr val="accent2"/>
             </a:effectRef>
             <a:fontRef idx="minor">
               <a:schemeClr val="lt1"/>
@@ -6298,7 +6694,7 @@
                     <a:schemeClr val="bg1"/>
                   </a:solidFill>
                 </a:rPr>
-                <a:t>RestartGame</a:t>
+                <a:t>GoToMenuScene</a:t>
               </a:r>
               <a:endParaRPr lang="es-BO" dirty="0">
                 <a:solidFill>

</xml_diff>

<commit_message>
Pequeno avance con los destrutores
ahora se debe considerar como recargar el nivel, Reload o implementar un sistema de checkpoints
</commit_message>
<xml_diff>
--- a/Assets/BounceUp/Otros/GAMA MANAGER v1.pptx
+++ b/Assets/BounceUp/Otros/GAMA MANAGER v1.pptx
@@ -246,7 +246,7 @@
           <a:p>
             <a:fld id="{338214D8-2EAB-41A9-9603-723A21E27C68}" type="datetimeFigureOut">
               <a:rPr lang="es-BO" smtClean="0"/>
-              <a:t>2/11/2017</a:t>
+              <a:t>17/11/2017</a:t>
             </a:fld>
             <a:endParaRPr lang="es-BO"/>
           </a:p>
@@ -416,7 +416,7 @@
           <a:p>
             <a:fld id="{338214D8-2EAB-41A9-9603-723A21E27C68}" type="datetimeFigureOut">
               <a:rPr lang="es-BO" smtClean="0"/>
-              <a:t>2/11/2017</a:t>
+              <a:t>17/11/2017</a:t>
             </a:fld>
             <a:endParaRPr lang="es-BO"/>
           </a:p>
@@ -596,7 +596,7 @@
           <a:p>
             <a:fld id="{338214D8-2EAB-41A9-9603-723A21E27C68}" type="datetimeFigureOut">
               <a:rPr lang="es-BO" smtClean="0"/>
-              <a:t>2/11/2017</a:t>
+              <a:t>17/11/2017</a:t>
             </a:fld>
             <a:endParaRPr lang="es-BO"/>
           </a:p>
@@ -766,7 +766,7 @@
           <a:p>
             <a:fld id="{338214D8-2EAB-41A9-9603-723A21E27C68}" type="datetimeFigureOut">
               <a:rPr lang="es-BO" smtClean="0"/>
-              <a:t>2/11/2017</a:t>
+              <a:t>17/11/2017</a:t>
             </a:fld>
             <a:endParaRPr lang="es-BO"/>
           </a:p>
@@ -1012,7 +1012,7 @@
           <a:p>
             <a:fld id="{338214D8-2EAB-41A9-9603-723A21E27C68}" type="datetimeFigureOut">
               <a:rPr lang="es-BO" smtClean="0"/>
-              <a:t>2/11/2017</a:t>
+              <a:t>17/11/2017</a:t>
             </a:fld>
             <a:endParaRPr lang="es-BO"/>
           </a:p>
@@ -1244,7 +1244,7 @@
           <a:p>
             <a:fld id="{338214D8-2EAB-41A9-9603-723A21E27C68}" type="datetimeFigureOut">
               <a:rPr lang="es-BO" smtClean="0"/>
-              <a:t>2/11/2017</a:t>
+              <a:t>17/11/2017</a:t>
             </a:fld>
             <a:endParaRPr lang="es-BO"/>
           </a:p>
@@ -1611,7 +1611,7 @@
           <a:p>
             <a:fld id="{338214D8-2EAB-41A9-9603-723A21E27C68}" type="datetimeFigureOut">
               <a:rPr lang="es-BO" smtClean="0"/>
-              <a:t>2/11/2017</a:t>
+              <a:t>17/11/2017</a:t>
             </a:fld>
             <a:endParaRPr lang="es-BO"/>
           </a:p>
@@ -1729,7 +1729,7 @@
           <a:p>
             <a:fld id="{338214D8-2EAB-41A9-9603-723A21E27C68}" type="datetimeFigureOut">
               <a:rPr lang="es-BO" smtClean="0"/>
-              <a:t>2/11/2017</a:t>
+              <a:t>17/11/2017</a:t>
             </a:fld>
             <a:endParaRPr lang="es-BO"/>
           </a:p>
@@ -1824,7 +1824,7 @@
           <a:p>
             <a:fld id="{338214D8-2EAB-41A9-9603-723A21E27C68}" type="datetimeFigureOut">
               <a:rPr lang="es-BO" smtClean="0"/>
-              <a:t>2/11/2017</a:t>
+              <a:t>17/11/2017</a:t>
             </a:fld>
             <a:endParaRPr lang="es-BO"/>
           </a:p>
@@ -2101,7 +2101,7 @@
           <a:p>
             <a:fld id="{338214D8-2EAB-41A9-9603-723A21E27C68}" type="datetimeFigureOut">
               <a:rPr lang="es-BO" smtClean="0"/>
-              <a:t>2/11/2017</a:t>
+              <a:t>17/11/2017</a:t>
             </a:fld>
             <a:endParaRPr lang="es-BO"/>
           </a:p>
@@ -2358,7 +2358,7 @@
           <a:p>
             <a:fld id="{338214D8-2EAB-41A9-9603-723A21E27C68}" type="datetimeFigureOut">
               <a:rPr lang="es-BO" smtClean="0"/>
-              <a:t>2/11/2017</a:t>
+              <a:t>17/11/2017</a:t>
             </a:fld>
             <a:endParaRPr lang="es-BO"/>
           </a:p>
@@ -2571,7 +2571,7 @@
           <a:p>
             <a:fld id="{338214D8-2EAB-41A9-9603-723A21E27C68}" type="datetimeFigureOut">
               <a:rPr lang="es-BO" smtClean="0"/>
-              <a:t>2/11/2017</a:t>
+              <a:t>17/11/2017</a:t>
             </a:fld>
             <a:endParaRPr lang="es-BO"/>
           </a:p>
@@ -6762,7 +6762,11 @@
           <a:p>
             <a:r>
               <a:rPr lang="es-419" dirty="0" smtClean="0"/>
-              <a:t>PLAYRE MANAGER v1.0</a:t>
+              <a:t>PLAYER </a:t>
+            </a:r>
+            <a:r>
+              <a:rPr lang="es-419" dirty="0" smtClean="0"/>
+              <a:t>MANAGER v1.0</a:t>
             </a:r>
             <a:endParaRPr lang="es-BO" dirty="0"/>
           </a:p>
@@ -7330,7 +7334,7 @@
           <a:lstStyle/>
           <a:p>
             <a:pPr algn="ctr"/>
-            <a:endParaRPr lang="es-BO" dirty="0"/>
+            <a:endParaRPr lang="es-BO" u="sng" dirty="0"/>
           </a:p>
         </p:txBody>
       </p:sp>
@@ -7997,6 +8001,82 @@
           </a:p>
         </p:txBody>
       </p:sp>
+      <p:sp>
+        <p:nvSpPr>
+          <p:cNvPr id="34" name="Rectángulo 33"/>
+          <p:cNvSpPr/>
+          <p:nvPr/>
+        </p:nvSpPr>
+        <p:spPr>
+          <a:xfrm>
+            <a:off x="7521388" y="3083886"/>
+            <a:ext cx="3944471" cy="2049219"/>
+          </a:xfrm>
+          <a:prstGeom prst="rect">
+            <a:avLst/>
+          </a:prstGeom>
+        </p:spPr>
+        <p:style>
+          <a:lnRef idx="2">
+            <a:schemeClr val="dk1"/>
+          </a:lnRef>
+          <a:fillRef idx="1">
+            <a:schemeClr val="lt1"/>
+          </a:fillRef>
+          <a:effectRef idx="0">
+            <a:schemeClr val="dk1"/>
+          </a:effectRef>
+          <a:fontRef idx="minor">
+            <a:schemeClr val="dk1"/>
+          </a:fontRef>
+        </p:style>
+        <p:txBody>
+          <a:bodyPr rtlCol="0" anchor="ctr"/>
+          <a:lstStyle/>
+          <a:p>
+            <a:r>
+              <a:rPr lang="es-419" dirty="0" smtClean="0"/>
+              <a:t>Al Perder una vida, se debe considerar la recarga de la scena o checkpoints</a:t>
+            </a:r>
+            <a:endParaRPr lang="es-BO" sz="1200" dirty="0"/>
+          </a:p>
+        </p:txBody>
+      </p:sp>
+      <p:cxnSp>
+        <p:nvCxnSpPr>
+          <p:cNvPr id="8" name="Conector recto de flecha 7"/>
+          <p:cNvCxnSpPr>
+            <a:stCxn id="30" idx="3"/>
+          </p:cNvCxnSpPr>
+          <p:nvPr/>
+        </p:nvCxnSpPr>
+        <p:spPr>
+          <a:xfrm>
+            <a:off x="6526399" y="1978815"/>
+            <a:ext cx="1111529" cy="1105071"/>
+          </a:xfrm>
+          <a:prstGeom prst="straightConnector1">
+            <a:avLst/>
+          </a:prstGeom>
+          <a:ln>
+            <a:tailEnd type="triangle"/>
+          </a:ln>
+        </p:spPr>
+        <p:style>
+          <a:lnRef idx="1">
+            <a:schemeClr val="accent1"/>
+          </a:lnRef>
+          <a:fillRef idx="0">
+            <a:schemeClr val="accent1"/>
+          </a:fillRef>
+          <a:effectRef idx="0">
+            <a:schemeClr val="accent1"/>
+          </a:effectRef>
+          <a:fontRef idx="minor">
+            <a:schemeClr val="tx1"/>
+          </a:fontRef>
+        </p:style>
+      </p:cxnSp>
     </p:spTree>
     <p:extLst>
       <p:ext uri="{BB962C8B-B14F-4D97-AF65-F5344CB8AC3E}">

</xml_diff>